<commit_message>
updated parms & organization
</commit_message>
<xml_diff>
--- a/presentations/Jun3.pptx
+++ b/presentations/Jun3.pptx
@@ -9,8 +9,8 @@
   </p:notesMasterIdLst>
   <p:sldIdLst>
     <p:sldId id="256" r:id="rId2"/>
-    <p:sldId id="299" r:id="rId3"/>
-    <p:sldId id="318" r:id="rId4"/>
+    <p:sldId id="318" r:id="rId3"/>
+    <p:sldId id="309" r:id="rId4"/>
     <p:sldId id="316" r:id="rId5"/>
     <p:sldId id="302" r:id="rId6"/>
     <p:sldId id="319" r:id="rId7"/>
@@ -477,10 +477,10 @@
   <p:cSld>
     <p:spTree>
       <p:nvGrpSpPr>
-        <p:cNvPr id="1" name="Shape 170">
+        <p:cNvPr id="1" name="Shape 203">
           <a:extLst>
             <a:ext uri="{FF2B5EF4-FFF2-40B4-BE49-F238E27FC236}">
-              <a16:creationId xmlns:a16="http://schemas.microsoft.com/office/drawing/2014/main" id="{D2578813-EAC3-02BF-BB48-B5132D9F3A3B}"/>
+              <a16:creationId xmlns:a16="http://schemas.microsoft.com/office/drawing/2014/main" id="{A302998A-B73D-04F5-EB20-1A3C765E1F9C}"/>
             </a:ext>
           </a:extLst>
         </p:cNvPr>
@@ -497,10 +497,10 @@
       </p:grpSpPr>
       <p:sp>
         <p:nvSpPr>
-          <p:cNvPr id="171" name="Google Shape;171;g4dfce81f19_0_45:notes">
-            <a:extLst>
-              <a:ext uri="{FF2B5EF4-FFF2-40B4-BE49-F238E27FC236}">
-                <a16:creationId xmlns:a16="http://schemas.microsoft.com/office/drawing/2014/main" id="{6FC93E91-4A71-A4A4-B4DC-FC364CC9A6A5}"/>
+          <p:cNvPr id="204" name="Google Shape;204;g54dda1946d_6_322:notes">
+            <a:extLst>
+              <a:ext uri="{FF2B5EF4-FFF2-40B4-BE49-F238E27FC236}">
+                <a16:creationId xmlns:a16="http://schemas.microsoft.com/office/drawing/2014/main" id="{3B25BCE6-C26E-C492-29F8-576BD214A2EA}"/>
               </a:ext>
             </a:extLst>
           </p:cNvPr>
@@ -544,10 +544,10 @@
       </p:sp>
       <p:sp>
         <p:nvSpPr>
-          <p:cNvPr id="172" name="Google Shape;172;g4dfce81f19_0_45:notes">
-            <a:extLst>
-              <a:ext uri="{FF2B5EF4-FFF2-40B4-BE49-F238E27FC236}">
-                <a16:creationId xmlns:a16="http://schemas.microsoft.com/office/drawing/2014/main" id="{D2FFBABA-FBED-60A5-CA48-B453AE0FD51E}"/>
+          <p:cNvPr id="205" name="Google Shape;205;g54dda1946d_6_322:notes">
+            <a:extLst>
+              <a:ext uri="{FF2B5EF4-FFF2-40B4-BE49-F238E27FC236}">
+                <a16:creationId xmlns:a16="http://schemas.microsoft.com/office/drawing/2014/main" id="{C4B1164F-8891-7B5D-6D57-C665F16E81F2}"/>
               </a:ext>
             </a:extLst>
           </p:cNvPr>
@@ -582,14 +582,41 @@
               </a:spcAft>
               <a:buNone/>
             </a:pPr>
-            <a:endParaRPr/>
+            <a:r>
+              <a:rPr lang="en-US" dirty="0"/>
+              <a:t>Walk through flow</a:t>
+            </a:r>
+          </a:p>
+          <a:p>
+            <a:pPr marL="0" lvl="0" indent="0" algn="l" rtl="0">
+              <a:spcBef>
+                <a:spcPts val="0"/>
+              </a:spcBef>
+              <a:spcAft>
+                <a:spcPts val="0"/>
+              </a:spcAft>
+              <a:buNone/>
+            </a:pPr>
+            <a:r>
+              <a:rPr lang="en-US" dirty="0"/>
+              <a:t>Explain 2</a:t>
+            </a:r>
+            <a:r>
+              <a:rPr lang="en-US" baseline="30000" dirty="0"/>
+              <a:t>nd</a:t>
+            </a:r>
+            <a:r>
+              <a:rPr lang="en-US" dirty="0"/>
+              <a:t> group : base immunity </a:t>
+            </a:r>
+            <a:endParaRPr dirty="0"/>
           </a:p>
         </p:txBody>
       </p:sp>
     </p:spTree>
     <p:extLst>
       <p:ext uri="{BB962C8B-B14F-4D97-AF65-F5344CB8AC3E}">
-        <p14:creationId xmlns:p14="http://schemas.microsoft.com/office/powerpoint/2010/main" val="4102398874"/>
+        <p14:creationId xmlns:p14="http://schemas.microsoft.com/office/powerpoint/2010/main" val="1445168444"/>
       </p:ext>
     </p:extLst>
   </p:cSld>
@@ -1127,7 +1154,7 @@
         <p:cNvPr id="1" name="Shape 203">
           <a:extLst>
             <a:ext uri="{FF2B5EF4-FFF2-40B4-BE49-F238E27FC236}">
-              <a16:creationId xmlns:a16="http://schemas.microsoft.com/office/drawing/2014/main" id="{A302998A-B73D-04F5-EB20-1A3C765E1F9C}"/>
+              <a16:creationId xmlns:a16="http://schemas.microsoft.com/office/drawing/2014/main" id="{6ADCFB8B-5932-4472-B899-6F7E9A3CB885}"/>
             </a:ext>
           </a:extLst>
         </p:cNvPr>
@@ -1147,7 +1174,7 @@
           <p:cNvPr id="204" name="Google Shape;204;g54dda1946d_6_322:notes">
             <a:extLst>
               <a:ext uri="{FF2B5EF4-FFF2-40B4-BE49-F238E27FC236}">
-                <a16:creationId xmlns:a16="http://schemas.microsoft.com/office/drawing/2014/main" id="{3B25BCE6-C26E-C492-29F8-576BD214A2EA}"/>
+                <a16:creationId xmlns:a16="http://schemas.microsoft.com/office/drawing/2014/main" id="{9FC4781C-4B27-2A13-F898-3ECEA3BACBD5}"/>
               </a:ext>
             </a:extLst>
           </p:cNvPr>
@@ -1194,7 +1221,7 @@
           <p:cNvPr id="205" name="Google Shape;205;g54dda1946d_6_322:notes">
             <a:extLst>
               <a:ext uri="{FF2B5EF4-FFF2-40B4-BE49-F238E27FC236}">
-                <a16:creationId xmlns:a16="http://schemas.microsoft.com/office/drawing/2014/main" id="{C4B1164F-8891-7B5D-6D57-C665F16E81F2}"/>
+                <a16:creationId xmlns:a16="http://schemas.microsoft.com/office/drawing/2014/main" id="{82EFEB6A-E8CA-CB8E-A94F-DF4F53281A49}"/>
               </a:ext>
             </a:extLst>
           </p:cNvPr>
@@ -1263,7 +1290,7 @@
     </p:spTree>
     <p:extLst>
       <p:ext uri="{BB962C8B-B14F-4D97-AF65-F5344CB8AC3E}">
-        <p14:creationId xmlns:p14="http://schemas.microsoft.com/office/powerpoint/2010/main" val="1445168444"/>
+        <p14:creationId xmlns:p14="http://schemas.microsoft.com/office/powerpoint/2010/main" val="2852857256"/>
       </p:ext>
     </p:extLst>
   </p:cSld>
@@ -8171,106 +8198,6 @@
   <p:cSld>
     <p:spTree>
       <p:nvGrpSpPr>
-        <p:cNvPr id="1" name="Shape 173">
-          <a:extLst>
-            <a:ext uri="{FF2B5EF4-FFF2-40B4-BE49-F238E27FC236}">
-              <a16:creationId xmlns:a16="http://schemas.microsoft.com/office/drawing/2014/main" id="{DDDA001C-6D09-507C-1DD9-54F6466BA01D}"/>
-            </a:ext>
-          </a:extLst>
-        </p:cNvPr>
-        <p:cNvGrpSpPr/>
-        <p:nvPr/>
-      </p:nvGrpSpPr>
-      <p:grpSpPr>
-        <a:xfrm>
-          <a:off x="0" y="0"/>
-          <a:ext cx="0" cy="0"/>
-          <a:chOff x="0" y="0"/>
-          <a:chExt cx="0" cy="0"/>
-        </a:xfrm>
-      </p:grpSpPr>
-      <p:sp>
-        <p:nvSpPr>
-          <p:cNvPr id="174" name="Google Shape;174;p30">
-            <a:extLst>
-              <a:ext uri="{FF2B5EF4-FFF2-40B4-BE49-F238E27FC236}">
-                <a16:creationId xmlns:a16="http://schemas.microsoft.com/office/drawing/2014/main" id="{C2F26E90-2534-A434-1BCA-9374DCFA9213}"/>
-              </a:ext>
-            </a:extLst>
-          </p:cNvPr>
-          <p:cNvSpPr txBox="1">
-            <a:spLocks noGrp="1"/>
-          </p:cNvSpPr>
-          <p:nvPr>
-            <p:ph type="ctrTitle"/>
-          </p:nvPr>
-        </p:nvSpPr>
-        <p:spPr>
-          <a:xfrm>
-            <a:off x="1151932" y="1459803"/>
-            <a:ext cx="9593843" cy="3938395"/>
-          </a:xfrm>
-          <a:prstGeom prst="rect">
-            <a:avLst/>
-          </a:prstGeom>
-        </p:spPr>
-        <p:txBody>
-          <a:bodyPr spcFirstLastPara="1" vert="horz" wrap="square" lIns="121900" tIns="121900" rIns="121900" bIns="121900" rtlCol="0" anchor="b" anchorCtr="0">
-            <a:noAutofit/>
-          </a:bodyPr>
-          <a:lstStyle/>
-          <a:p>
-            <a:pPr>
-              <a:spcBef>
-                <a:spcPts val="0"/>
-              </a:spcBef>
-            </a:pPr>
-            <a:r>
-              <a:rPr lang="en" sz="4000" dirty="0">
-                <a:latin typeface="Georgia Pro" panose="02040502050405020303" pitchFamily="18" charset="0"/>
-              </a:rPr>
-              <a:t>How do adults and children behave       differently with respect to vaccination behavior?</a:t>
-            </a:r>
-            <a:br>
-              <a:rPr lang="en" sz="4000" dirty="0">
-                <a:latin typeface="Georgia Pro" panose="02040502050405020303" pitchFamily="18" charset="0"/>
-              </a:rPr>
-            </a:br>
-            <a:br>
-              <a:rPr lang="en" sz="4000" dirty="0">
-                <a:latin typeface="Georgia Pro" panose="02040502050405020303" pitchFamily="18" charset="0"/>
-              </a:rPr>
-            </a:br>
-            <a:r>
-              <a:rPr lang="en" sz="4000" dirty="0">
-                <a:latin typeface="Georgia Pro" panose="02040502050405020303" pitchFamily="18" charset="0"/>
-              </a:rPr>
-              <a:t>Are these consistent across respiratory pathogens?</a:t>
-            </a:r>
-            <a:endParaRPr sz="4000" dirty="0">
-              <a:latin typeface="Georgia Pro" panose="02040502050405020303" pitchFamily="18" charset="0"/>
-            </a:endParaRPr>
-          </a:p>
-        </p:txBody>
-      </p:sp>
-    </p:spTree>
-    <p:extLst>
-      <p:ext uri="{BB962C8B-B14F-4D97-AF65-F5344CB8AC3E}">
-        <p14:creationId xmlns:p14="http://schemas.microsoft.com/office/powerpoint/2010/main" val="2467076926"/>
-      </p:ext>
-    </p:extLst>
-  </p:cSld>
-  <p:clrMapOvr>
-    <a:masterClrMapping/>
-  </p:clrMapOvr>
-</p:sld>
-</file>
-
-<file path=ppt/slides/slide3.xml><?xml version="1.0" encoding="utf-8"?>
-<p:sld xmlns:a="http://schemas.openxmlformats.org/drawingml/2006/main" xmlns:r="http://schemas.openxmlformats.org/officeDocument/2006/relationships" xmlns:p="http://schemas.openxmlformats.org/presentationml/2006/main">
-  <p:cSld>
-    <p:spTree>
-      <p:nvGrpSpPr>
         <p:cNvPr id="1" name="Shape 206">
           <a:extLst>
             <a:ext uri="{FF2B5EF4-FFF2-40B4-BE49-F238E27FC236}">
@@ -8463,7 +8390,7 @@
         <p:spPr>
           <a:xfrm>
             <a:off x="5366151" y="3160479"/>
-            <a:ext cx="2186608" cy="719099"/>
+            <a:ext cx="2715168" cy="719099"/>
           </a:xfrm>
           <a:prstGeom prst="rect">
             <a:avLst/>
@@ -8678,7 +8605,7 @@
         <p:spPr>
           <a:xfrm>
             <a:off x="5324183" y="2052182"/>
-            <a:ext cx="1135272" cy="1108297"/>
+            <a:ext cx="1399552" cy="1108297"/>
           </a:xfrm>
           <a:prstGeom prst="curvedConnector2">
             <a:avLst/>
@@ -8725,8 +8652,8 @@
         </p:nvCxnSpPr>
         <p:spPr>
           <a:xfrm rot="5400000">
-            <a:off x="5337672" y="3866089"/>
-            <a:ext cx="1108297" cy="1135272"/>
+            <a:off x="5469811" y="3733950"/>
+            <a:ext cx="1108297" cy="1399552"/>
           </a:xfrm>
           <a:prstGeom prst="curvedConnector2">
             <a:avLst/>
@@ -9400,6 +9327,3788 @@
 </p:sld>
 </file>
 
+<file path=ppt/slides/slide3.xml><?xml version="1.0" encoding="utf-8"?>
+<p:sld xmlns:a="http://schemas.openxmlformats.org/drawingml/2006/main" xmlns:r="http://schemas.openxmlformats.org/officeDocument/2006/relationships" xmlns:p="http://schemas.openxmlformats.org/presentationml/2006/main">
+  <p:cSld>
+    <p:spTree>
+      <p:nvGrpSpPr>
+        <p:cNvPr id="1" name="Shape 206">
+          <a:extLst>
+            <a:ext uri="{FF2B5EF4-FFF2-40B4-BE49-F238E27FC236}">
+              <a16:creationId xmlns:a16="http://schemas.microsoft.com/office/drawing/2014/main" id="{C1EE6B80-7861-5AA2-749F-888E03943451}"/>
+            </a:ext>
+          </a:extLst>
+        </p:cNvPr>
+        <p:cNvGrpSpPr/>
+        <p:nvPr/>
+      </p:nvGrpSpPr>
+      <p:grpSpPr>
+        <a:xfrm>
+          <a:off x="0" y="0"/>
+          <a:ext cx="0" cy="0"/>
+          <a:chOff x="0" y="0"/>
+          <a:chExt cx="0" cy="0"/>
+        </a:xfrm>
+      </p:grpSpPr>
+      <p:sp>
+        <p:nvSpPr>
+          <p:cNvPr id="207" name="Google Shape;207;p33">
+            <a:extLst>
+              <a:ext uri="{FF2B5EF4-FFF2-40B4-BE49-F238E27FC236}">
+                <a16:creationId xmlns:a16="http://schemas.microsoft.com/office/drawing/2014/main" id="{FBB75043-C0A1-BDC8-E76D-4511CCBBFD53}"/>
+              </a:ext>
+            </a:extLst>
+          </p:cNvPr>
+          <p:cNvSpPr txBox="1">
+            <a:spLocks noGrp="1"/>
+          </p:cNvSpPr>
+          <p:nvPr>
+            <p:ph type="title"/>
+          </p:nvPr>
+        </p:nvSpPr>
+        <p:spPr>
+          <a:xfrm>
+            <a:off x="950967" y="466728"/>
+            <a:ext cx="10728128" cy="1411600"/>
+          </a:xfrm>
+          <a:prstGeom prst="rect">
+            <a:avLst/>
+          </a:prstGeom>
+        </p:spPr>
+        <p:txBody>
+          <a:bodyPr spcFirstLastPara="1" vert="horz" wrap="square" lIns="121900" tIns="121900" rIns="121900" bIns="121900" rtlCol="0" anchor="t" anchorCtr="0">
+            <a:noAutofit/>
+          </a:bodyPr>
+          <a:lstStyle/>
+          <a:p>
+            <a:r>
+              <a:rPr lang="en" dirty="0">
+                <a:latin typeface="Georgia Pro" panose="02040502050405020303" pitchFamily="18" charset="0"/>
+              </a:rPr>
+              <a:t>Age-Stratified SEIRD Model </a:t>
+            </a:r>
+            <a:endParaRPr i="1" dirty="0">
+              <a:latin typeface="Georgia Pro" panose="02040502050405020303" pitchFamily="18" charset="0"/>
+            </a:endParaRPr>
+          </a:p>
+        </p:txBody>
+      </p:sp>
+      <p:sp>
+        <p:nvSpPr>
+          <p:cNvPr id="2" name="Rectangle 1">
+            <a:extLst>
+              <a:ext uri="{FF2B5EF4-FFF2-40B4-BE49-F238E27FC236}">
+                <a16:creationId xmlns:a16="http://schemas.microsoft.com/office/drawing/2014/main" id="{1F8D81EB-9056-08E0-1A8E-0AF150D49C68}"/>
+              </a:ext>
+            </a:extLst>
+          </p:cNvPr>
+          <p:cNvSpPr/>
+          <p:nvPr/>
+        </p:nvSpPr>
+        <p:spPr>
+          <a:xfrm>
+            <a:off x="950967" y="1969330"/>
+            <a:ext cx="812800" cy="731188"/>
+          </a:xfrm>
+          <a:prstGeom prst="rect">
+            <a:avLst/>
+          </a:prstGeom>
+          <a:noFill/>
+        </p:spPr>
+        <p:style>
+          <a:lnRef idx="2">
+            <a:schemeClr val="accent1">
+              <a:shade val="15000"/>
+            </a:schemeClr>
+          </a:lnRef>
+          <a:fillRef idx="1">
+            <a:schemeClr val="accent1"/>
+          </a:fillRef>
+          <a:effectRef idx="0">
+            <a:schemeClr val="accent1"/>
+          </a:effectRef>
+          <a:fontRef idx="minor">
+            <a:schemeClr val="lt1"/>
+          </a:fontRef>
+        </p:style>
+        <p:txBody>
+          <a:bodyPr rtlCol="0" anchor="ctr"/>
+          <a:lstStyle/>
+          <a:p>
+            <a:pPr algn="ctr"/>
+            <a:r>
+              <a:rPr lang="en-US" sz="2400" dirty="0">
+                <a:solidFill>
+                  <a:schemeClr val="bg1">
+                    <a:lumMod val="10000"/>
+                  </a:schemeClr>
+                </a:solidFill>
+                <a:latin typeface="Times New Roman" panose="02020603050405020304" pitchFamily="18" charset="0"/>
+                <a:cs typeface="Times New Roman" panose="02020603050405020304" pitchFamily="18" charset="0"/>
+              </a:rPr>
+              <a:t>S1</a:t>
+            </a:r>
+          </a:p>
+        </p:txBody>
+      </p:sp>
+      <p:sp>
+        <p:nvSpPr>
+          <p:cNvPr id="5" name="Rectangle 4">
+            <a:extLst>
+              <a:ext uri="{FF2B5EF4-FFF2-40B4-BE49-F238E27FC236}">
+                <a16:creationId xmlns:a16="http://schemas.microsoft.com/office/drawing/2014/main" id="{7DC5ECFD-8EB2-26FD-A802-4C62446254BE}"/>
+              </a:ext>
+            </a:extLst>
+          </p:cNvPr>
+          <p:cNvSpPr/>
+          <p:nvPr/>
+        </p:nvSpPr>
+        <p:spPr>
+          <a:xfrm>
+            <a:off x="2612192" y="1969330"/>
+            <a:ext cx="812800" cy="731188"/>
+          </a:xfrm>
+          <a:prstGeom prst="rect">
+            <a:avLst/>
+          </a:prstGeom>
+          <a:noFill/>
+        </p:spPr>
+        <p:style>
+          <a:lnRef idx="2">
+            <a:schemeClr val="accent1">
+              <a:shade val="15000"/>
+            </a:schemeClr>
+          </a:lnRef>
+          <a:fillRef idx="1">
+            <a:schemeClr val="accent1"/>
+          </a:fillRef>
+          <a:effectRef idx="0">
+            <a:schemeClr val="accent1"/>
+          </a:effectRef>
+          <a:fontRef idx="minor">
+            <a:schemeClr val="lt1"/>
+          </a:fontRef>
+        </p:style>
+        <p:txBody>
+          <a:bodyPr rtlCol="0" anchor="ctr"/>
+          <a:lstStyle/>
+          <a:p>
+            <a:pPr algn="ctr"/>
+            <a:r>
+              <a:rPr lang="en-US" sz="2400" dirty="0">
+                <a:solidFill>
+                  <a:schemeClr val="bg1">
+                    <a:lumMod val="10000"/>
+                  </a:schemeClr>
+                </a:solidFill>
+                <a:latin typeface="Times New Roman" panose="02020603050405020304" pitchFamily="18" charset="0"/>
+                <a:cs typeface="Times New Roman" panose="02020603050405020304" pitchFamily="18" charset="0"/>
+              </a:rPr>
+              <a:t>E1</a:t>
+            </a:r>
+          </a:p>
+        </p:txBody>
+      </p:sp>
+      <p:sp>
+        <p:nvSpPr>
+          <p:cNvPr id="6" name="Rectangle 5">
+            <a:extLst>
+              <a:ext uri="{FF2B5EF4-FFF2-40B4-BE49-F238E27FC236}">
+                <a16:creationId xmlns:a16="http://schemas.microsoft.com/office/drawing/2014/main" id="{392D76AA-B39F-80DA-4BD6-5DAD27DEB289}"/>
+              </a:ext>
+            </a:extLst>
+          </p:cNvPr>
+          <p:cNvSpPr/>
+          <p:nvPr/>
+        </p:nvSpPr>
+        <p:spPr>
+          <a:xfrm>
+            <a:off x="4237792" y="1990350"/>
+            <a:ext cx="812800" cy="731188"/>
+          </a:xfrm>
+          <a:prstGeom prst="rect">
+            <a:avLst/>
+          </a:prstGeom>
+          <a:noFill/>
+        </p:spPr>
+        <p:style>
+          <a:lnRef idx="2">
+            <a:schemeClr val="accent1">
+              <a:shade val="15000"/>
+            </a:schemeClr>
+          </a:lnRef>
+          <a:fillRef idx="1">
+            <a:schemeClr val="accent1"/>
+          </a:fillRef>
+          <a:effectRef idx="0">
+            <a:schemeClr val="accent1"/>
+          </a:effectRef>
+          <a:fontRef idx="minor">
+            <a:schemeClr val="lt1"/>
+          </a:fontRef>
+        </p:style>
+        <p:txBody>
+          <a:bodyPr rtlCol="0" anchor="ctr"/>
+          <a:lstStyle/>
+          <a:p>
+            <a:pPr algn="ctr"/>
+            <a:r>
+              <a:rPr lang="en-US" sz="2400" dirty="0">
+                <a:solidFill>
+                  <a:schemeClr val="bg1">
+                    <a:lumMod val="10000"/>
+                  </a:schemeClr>
+                </a:solidFill>
+                <a:latin typeface="Times New Roman" panose="02020603050405020304" pitchFamily="18" charset="0"/>
+                <a:cs typeface="Times New Roman" panose="02020603050405020304" pitchFamily="18" charset="0"/>
+              </a:rPr>
+              <a:t>I1</a:t>
+            </a:r>
+          </a:p>
+        </p:txBody>
+      </p:sp>
+      <p:sp>
+        <p:nvSpPr>
+          <p:cNvPr id="7" name="Rectangle 6">
+            <a:extLst>
+              <a:ext uri="{FF2B5EF4-FFF2-40B4-BE49-F238E27FC236}">
+                <a16:creationId xmlns:a16="http://schemas.microsoft.com/office/drawing/2014/main" id="{DE9401F7-096F-A1B7-E859-290B89731DD3}"/>
+              </a:ext>
+            </a:extLst>
+          </p:cNvPr>
+          <p:cNvSpPr/>
+          <p:nvPr/>
+        </p:nvSpPr>
+        <p:spPr>
+          <a:xfrm>
+            <a:off x="5908715" y="2638677"/>
+            <a:ext cx="812800" cy="731188"/>
+          </a:xfrm>
+          <a:prstGeom prst="rect">
+            <a:avLst/>
+          </a:prstGeom>
+          <a:noFill/>
+        </p:spPr>
+        <p:style>
+          <a:lnRef idx="2">
+            <a:schemeClr val="accent1">
+              <a:shade val="15000"/>
+            </a:schemeClr>
+          </a:lnRef>
+          <a:fillRef idx="1">
+            <a:schemeClr val="accent1"/>
+          </a:fillRef>
+          <a:effectRef idx="0">
+            <a:schemeClr val="accent1"/>
+          </a:effectRef>
+          <a:fontRef idx="minor">
+            <a:schemeClr val="lt1"/>
+          </a:fontRef>
+        </p:style>
+        <p:txBody>
+          <a:bodyPr rtlCol="0" anchor="ctr"/>
+          <a:lstStyle/>
+          <a:p>
+            <a:pPr algn="ctr"/>
+            <a:r>
+              <a:rPr lang="en-US" sz="2400" dirty="0">
+                <a:solidFill>
+                  <a:schemeClr val="bg1">
+                    <a:lumMod val="10000"/>
+                  </a:schemeClr>
+                </a:solidFill>
+                <a:latin typeface="Times New Roman" panose="02020603050405020304" pitchFamily="18" charset="0"/>
+                <a:cs typeface="Times New Roman" panose="02020603050405020304" pitchFamily="18" charset="0"/>
+              </a:rPr>
+              <a:t>R1</a:t>
+            </a:r>
+          </a:p>
+        </p:txBody>
+      </p:sp>
+      <p:sp>
+        <p:nvSpPr>
+          <p:cNvPr id="8" name="Rectangle 7">
+            <a:extLst>
+              <a:ext uri="{FF2B5EF4-FFF2-40B4-BE49-F238E27FC236}">
+                <a16:creationId xmlns:a16="http://schemas.microsoft.com/office/drawing/2014/main" id="{4E3FD87F-2DA1-625A-5BAA-4C9DD94FEEA9}"/>
+              </a:ext>
+            </a:extLst>
+          </p:cNvPr>
+          <p:cNvSpPr/>
+          <p:nvPr/>
+        </p:nvSpPr>
+        <p:spPr>
+          <a:xfrm>
+            <a:off x="5903077" y="1491310"/>
+            <a:ext cx="812800" cy="731188"/>
+          </a:xfrm>
+          <a:prstGeom prst="rect">
+            <a:avLst/>
+          </a:prstGeom>
+          <a:noFill/>
+        </p:spPr>
+        <p:style>
+          <a:lnRef idx="2">
+            <a:schemeClr val="accent1">
+              <a:shade val="15000"/>
+            </a:schemeClr>
+          </a:lnRef>
+          <a:fillRef idx="1">
+            <a:schemeClr val="accent1"/>
+          </a:fillRef>
+          <a:effectRef idx="0">
+            <a:schemeClr val="accent1"/>
+          </a:effectRef>
+          <a:fontRef idx="minor">
+            <a:schemeClr val="lt1"/>
+          </a:fontRef>
+        </p:style>
+        <p:txBody>
+          <a:bodyPr rtlCol="0" anchor="ctr"/>
+          <a:lstStyle/>
+          <a:p>
+            <a:pPr algn="ctr"/>
+            <a:r>
+              <a:rPr lang="en-US" sz="2400" dirty="0">
+                <a:solidFill>
+                  <a:schemeClr val="bg1">
+                    <a:lumMod val="10000"/>
+                  </a:schemeClr>
+                </a:solidFill>
+                <a:latin typeface="Times New Roman" panose="02020603050405020304" pitchFamily="18" charset="0"/>
+                <a:cs typeface="Times New Roman" panose="02020603050405020304" pitchFamily="18" charset="0"/>
+              </a:rPr>
+              <a:t>D1</a:t>
+            </a:r>
+          </a:p>
+        </p:txBody>
+      </p:sp>
+      <p:cxnSp>
+        <p:nvCxnSpPr>
+          <p:cNvPr id="10" name="Straight Arrow Connector 9">
+            <a:extLst>
+              <a:ext uri="{FF2B5EF4-FFF2-40B4-BE49-F238E27FC236}">
+                <a16:creationId xmlns:a16="http://schemas.microsoft.com/office/drawing/2014/main" id="{119728C8-54E8-F791-5767-F7D86FB9B017}"/>
+              </a:ext>
+            </a:extLst>
+          </p:cNvPr>
+          <p:cNvCxnSpPr>
+            <a:cxnSpLocks/>
+            <a:stCxn id="2" idx="3"/>
+          </p:cNvCxnSpPr>
+          <p:nvPr/>
+        </p:nvCxnSpPr>
+        <p:spPr>
+          <a:xfrm>
+            <a:off x="1763767" y="2334924"/>
+            <a:ext cx="847687" cy="0"/>
+          </a:xfrm>
+          <a:prstGeom prst="straightConnector1">
+            <a:avLst/>
+          </a:prstGeom>
+          <a:ln>
+            <a:solidFill>
+              <a:schemeClr val="tx1">
+                <a:lumMod val="50000"/>
+              </a:schemeClr>
+            </a:solidFill>
+            <a:tailEnd type="triangle"/>
+          </a:ln>
+        </p:spPr>
+        <p:style>
+          <a:lnRef idx="1">
+            <a:schemeClr val="accent1"/>
+          </a:lnRef>
+          <a:fillRef idx="0">
+            <a:schemeClr val="accent1"/>
+          </a:fillRef>
+          <a:effectRef idx="0">
+            <a:schemeClr val="accent1"/>
+          </a:effectRef>
+          <a:fontRef idx="minor">
+            <a:schemeClr val="tx1"/>
+          </a:fontRef>
+        </p:style>
+      </p:cxnSp>
+      <p:cxnSp>
+        <p:nvCxnSpPr>
+          <p:cNvPr id="11" name="Straight Arrow Connector 10">
+            <a:extLst>
+              <a:ext uri="{FF2B5EF4-FFF2-40B4-BE49-F238E27FC236}">
+                <a16:creationId xmlns:a16="http://schemas.microsoft.com/office/drawing/2014/main" id="{9B2D1E11-B0A9-6970-F93B-9BD693AE9190}"/>
+              </a:ext>
+            </a:extLst>
+          </p:cNvPr>
+          <p:cNvCxnSpPr>
+            <a:cxnSpLocks/>
+            <a:endCxn id="6" idx="1"/>
+          </p:cNvCxnSpPr>
+          <p:nvPr/>
+        </p:nvCxnSpPr>
+        <p:spPr>
+          <a:xfrm>
+            <a:off x="3424992" y="2355920"/>
+            <a:ext cx="812800" cy="24"/>
+          </a:xfrm>
+          <a:prstGeom prst="straightConnector1">
+            <a:avLst/>
+          </a:prstGeom>
+          <a:ln>
+            <a:solidFill>
+              <a:schemeClr val="tx1">
+                <a:lumMod val="50000"/>
+              </a:schemeClr>
+            </a:solidFill>
+            <a:tailEnd type="triangle"/>
+          </a:ln>
+        </p:spPr>
+        <p:style>
+          <a:lnRef idx="1">
+            <a:schemeClr val="accent1"/>
+          </a:lnRef>
+          <a:fillRef idx="0">
+            <a:schemeClr val="accent1"/>
+          </a:fillRef>
+          <a:effectRef idx="0">
+            <a:schemeClr val="accent1"/>
+          </a:effectRef>
+          <a:fontRef idx="minor">
+            <a:schemeClr val="tx1"/>
+          </a:fontRef>
+        </p:style>
+      </p:cxnSp>
+      <p:cxnSp>
+        <p:nvCxnSpPr>
+          <p:cNvPr id="12" name="Straight Arrow Connector 11">
+            <a:extLst>
+              <a:ext uri="{FF2B5EF4-FFF2-40B4-BE49-F238E27FC236}">
+                <a16:creationId xmlns:a16="http://schemas.microsoft.com/office/drawing/2014/main" id="{8D9B3CF1-93C1-9A63-13EF-78EA558B2A02}"/>
+              </a:ext>
+            </a:extLst>
+          </p:cNvPr>
+          <p:cNvCxnSpPr>
+            <a:cxnSpLocks/>
+            <a:stCxn id="6" idx="3"/>
+            <a:endCxn id="7" idx="1"/>
+          </p:cNvCxnSpPr>
+          <p:nvPr/>
+        </p:nvCxnSpPr>
+        <p:spPr>
+          <a:xfrm>
+            <a:off x="5050592" y="2355945"/>
+            <a:ext cx="858123" cy="648327"/>
+          </a:xfrm>
+          <a:prstGeom prst="straightConnector1">
+            <a:avLst/>
+          </a:prstGeom>
+          <a:ln>
+            <a:solidFill>
+              <a:schemeClr val="tx1">
+                <a:lumMod val="50000"/>
+              </a:schemeClr>
+            </a:solidFill>
+            <a:tailEnd type="triangle"/>
+          </a:ln>
+        </p:spPr>
+        <p:style>
+          <a:lnRef idx="1">
+            <a:schemeClr val="accent1"/>
+          </a:lnRef>
+          <a:fillRef idx="0">
+            <a:schemeClr val="accent1"/>
+          </a:fillRef>
+          <a:effectRef idx="0">
+            <a:schemeClr val="accent1"/>
+          </a:effectRef>
+          <a:fontRef idx="minor">
+            <a:schemeClr val="tx1"/>
+          </a:fontRef>
+        </p:style>
+      </p:cxnSp>
+      <p:cxnSp>
+        <p:nvCxnSpPr>
+          <p:cNvPr id="13" name="Straight Arrow Connector 12">
+            <a:extLst>
+              <a:ext uri="{FF2B5EF4-FFF2-40B4-BE49-F238E27FC236}">
+                <a16:creationId xmlns:a16="http://schemas.microsoft.com/office/drawing/2014/main" id="{91CA1C4D-D923-3E33-2353-40F434DE5EE5}"/>
+              </a:ext>
+            </a:extLst>
+          </p:cNvPr>
+          <p:cNvCxnSpPr>
+            <a:cxnSpLocks/>
+            <a:stCxn id="6" idx="3"/>
+            <a:endCxn id="8" idx="1"/>
+          </p:cNvCxnSpPr>
+          <p:nvPr/>
+        </p:nvCxnSpPr>
+        <p:spPr>
+          <a:xfrm flipV="1">
+            <a:off x="5050592" y="1856904"/>
+            <a:ext cx="852485" cy="499040"/>
+          </a:xfrm>
+          <a:prstGeom prst="straightConnector1">
+            <a:avLst/>
+          </a:prstGeom>
+          <a:ln>
+            <a:solidFill>
+              <a:schemeClr val="tx1">
+                <a:lumMod val="50000"/>
+              </a:schemeClr>
+            </a:solidFill>
+            <a:tailEnd type="triangle"/>
+          </a:ln>
+        </p:spPr>
+        <p:style>
+          <a:lnRef idx="1">
+            <a:schemeClr val="accent1"/>
+          </a:lnRef>
+          <a:fillRef idx="0">
+            <a:schemeClr val="accent1"/>
+          </a:fillRef>
+          <a:effectRef idx="0">
+            <a:schemeClr val="accent1"/>
+          </a:effectRef>
+          <a:fontRef idx="minor">
+            <a:schemeClr val="tx1"/>
+          </a:fontRef>
+        </p:style>
+      </p:cxnSp>
+      <mc:AlternateContent xmlns:mc="http://schemas.openxmlformats.org/markup-compatibility/2006">
+        <mc:Choice xmlns:a14="http://schemas.microsoft.com/office/drawing/2010/main" Requires="a14">
+          <p:sp>
+            <p:nvSpPr>
+              <p:cNvPr id="14" name="TextBox 13">
+                <a:extLst>
+                  <a:ext uri="{FF2B5EF4-FFF2-40B4-BE49-F238E27FC236}">
+                    <a16:creationId xmlns:a16="http://schemas.microsoft.com/office/drawing/2014/main" id="{3A6E6913-DF1C-1167-3195-E70BEEBEB928}"/>
+                  </a:ext>
+                </a:extLst>
+              </p:cNvPr>
+              <p:cNvSpPr txBox="1"/>
+              <p:nvPr/>
+            </p:nvSpPr>
+            <p:spPr>
+              <a:xfrm>
+                <a:off x="2014414" y="1922199"/>
+                <a:ext cx="1224548" cy="359009"/>
+              </a:xfrm>
+              <a:prstGeom prst="rect">
+                <a:avLst/>
+              </a:prstGeom>
+              <a:noFill/>
+            </p:spPr>
+            <p:txBody>
+              <a:bodyPr wrap="square" rtlCol="0">
+                <a:spAutoFit/>
+              </a:bodyPr>
+              <a:lstStyle/>
+              <a:p>
+                <a14:m>
+                  <m:oMath xmlns:m="http://schemas.openxmlformats.org/officeDocument/2006/math">
+                    <m:r>
+                      <a:rPr lang="en-US" sz="1733" i="1">
+                        <a:latin typeface="Cambria Math" panose="02040503050406030204" pitchFamily="18" charset="0"/>
+                        <a:ea typeface="Cambria Math" panose="02040503050406030204" pitchFamily="18" charset="0"/>
+                      </a:rPr>
+                      <m:t>𝜆</m:t>
+                    </m:r>
+                  </m:oMath>
+                </a14:m>
+                <a:r>
+                  <a:rPr lang="en-US" sz="1733" dirty="0"/>
+                  <a:t> </a:t>
+                </a:r>
+              </a:p>
+            </p:txBody>
+          </p:sp>
+        </mc:Choice>
+        <mc:Fallback>
+          <p:sp>
+            <p:nvSpPr>
+              <p:cNvPr id="14" name="TextBox 13">
+                <a:extLst>
+                  <a:ext uri="{FF2B5EF4-FFF2-40B4-BE49-F238E27FC236}">
+                    <a16:creationId xmlns:a16="http://schemas.microsoft.com/office/drawing/2014/main" id="{3A6E6913-DF1C-1167-3195-E70BEEBEB928}"/>
+                  </a:ext>
+                </a:extLst>
+              </p:cNvPr>
+              <p:cNvSpPr txBox="1">
+                <a:spLocks noRot="1" noChangeAspect="1" noMove="1" noResize="1" noEditPoints="1" noAdjustHandles="1" noChangeArrowheads="1" noChangeShapeType="1" noTextEdit="1"/>
+              </p:cNvSpPr>
+              <p:nvPr/>
+            </p:nvSpPr>
+            <p:spPr>
+              <a:xfrm>
+                <a:off x="2014414" y="1922199"/>
+                <a:ext cx="1224548" cy="359009"/>
+              </a:xfrm>
+              <a:prstGeom prst="rect">
+                <a:avLst/>
+              </a:prstGeom>
+              <a:blipFill>
+                <a:blip r:embed="rId3"/>
+                <a:stretch>
+                  <a:fillRect/>
+                </a:stretch>
+              </a:blipFill>
+            </p:spPr>
+            <p:txBody>
+              <a:bodyPr/>
+              <a:lstStyle/>
+              <a:p>
+                <a:r>
+                  <a:rPr lang="en-US">
+                    <a:noFill/>
+                  </a:rPr>
+                  <a:t> </a:t>
+                </a:r>
+              </a:p>
+            </p:txBody>
+          </p:sp>
+        </mc:Fallback>
+      </mc:AlternateContent>
+      <mc:AlternateContent xmlns:mc="http://schemas.openxmlformats.org/markup-compatibility/2006">
+        <mc:Choice xmlns:a14="http://schemas.microsoft.com/office/drawing/2010/main" Requires="a14">
+          <p:sp>
+            <p:nvSpPr>
+              <p:cNvPr id="15" name="TextBox 14">
+                <a:extLst>
+                  <a:ext uri="{FF2B5EF4-FFF2-40B4-BE49-F238E27FC236}">
+                    <a16:creationId xmlns:a16="http://schemas.microsoft.com/office/drawing/2014/main" id="{1CD0E673-A5FB-1350-681E-3E33FBB36780}"/>
+                  </a:ext>
+                </a:extLst>
+              </p:cNvPr>
+              <p:cNvSpPr txBox="1"/>
+              <p:nvPr/>
+            </p:nvSpPr>
+            <p:spPr>
+              <a:xfrm>
+                <a:off x="3725171" y="1982274"/>
+                <a:ext cx="218864" cy="738664"/>
+              </a:xfrm>
+              <a:prstGeom prst="rect">
+                <a:avLst/>
+              </a:prstGeom>
+              <a:noFill/>
+            </p:spPr>
+            <p:txBody>
+              <a:bodyPr wrap="square" lIns="0" tIns="0" rIns="0" bIns="0" rtlCol="0">
+                <a:spAutoFit/>
+              </a:bodyPr>
+              <a:lstStyle/>
+              <a:p>
+                <a:pPr/>
+                <a14:m>
+                  <m:oMathPara xmlns:m="http://schemas.openxmlformats.org/officeDocument/2006/math">
+                    <m:oMathParaPr>
+                      <m:jc m:val="centerGroup"/>
+                    </m:oMathParaPr>
+                    <m:oMath xmlns:m="http://schemas.openxmlformats.org/officeDocument/2006/math">
+                      <m:r>
+                        <m:rPr>
+                          <m:sty m:val="p"/>
+                        </m:rPr>
+                        <a:rPr lang="en-US" sz="2400" i="1">
+                          <a:latin typeface="Cambria Math" panose="02040503050406030204" pitchFamily="18" charset="0"/>
+                        </a:rPr>
+                        <m:t>ϵ</m:t>
+                      </m:r>
+                    </m:oMath>
+                  </m:oMathPara>
+                </a14:m>
+                <a:endParaRPr lang="en-US" sz="2400" dirty="0"/>
+              </a:p>
+              <a:p>
+                <a:endParaRPr lang="en-US" sz="2400" dirty="0"/>
+              </a:p>
+            </p:txBody>
+          </p:sp>
+        </mc:Choice>
+        <mc:Fallback>
+          <p:sp>
+            <p:nvSpPr>
+              <p:cNvPr id="15" name="TextBox 14">
+                <a:extLst>
+                  <a:ext uri="{FF2B5EF4-FFF2-40B4-BE49-F238E27FC236}">
+                    <a16:creationId xmlns:a16="http://schemas.microsoft.com/office/drawing/2014/main" id="{1CD0E673-A5FB-1350-681E-3E33FBB36780}"/>
+                  </a:ext>
+                </a:extLst>
+              </p:cNvPr>
+              <p:cNvSpPr txBox="1">
+                <a:spLocks noRot="1" noChangeAspect="1" noMove="1" noResize="1" noEditPoints="1" noAdjustHandles="1" noChangeArrowheads="1" noChangeShapeType="1" noTextEdit="1"/>
+              </p:cNvSpPr>
+              <p:nvPr/>
+            </p:nvSpPr>
+            <p:spPr>
+              <a:xfrm>
+                <a:off x="3725171" y="1982274"/>
+                <a:ext cx="218864" cy="738664"/>
+              </a:xfrm>
+              <a:prstGeom prst="rect">
+                <a:avLst/>
+              </a:prstGeom>
+              <a:blipFill>
+                <a:blip r:embed="rId4"/>
+                <a:stretch>
+                  <a:fillRect l="-16667" r="-11111"/>
+                </a:stretch>
+              </a:blipFill>
+            </p:spPr>
+            <p:txBody>
+              <a:bodyPr/>
+              <a:lstStyle/>
+              <a:p>
+                <a:r>
+                  <a:rPr lang="en-US">
+                    <a:noFill/>
+                  </a:rPr>
+                  <a:t> </a:t>
+                </a:r>
+              </a:p>
+            </p:txBody>
+          </p:sp>
+        </mc:Fallback>
+      </mc:AlternateContent>
+      <mc:AlternateContent xmlns:mc="http://schemas.openxmlformats.org/markup-compatibility/2006">
+        <mc:Choice xmlns:a14="http://schemas.microsoft.com/office/drawing/2010/main" Requires="a14">
+          <p:sp>
+            <p:nvSpPr>
+              <p:cNvPr id="16" name="TextBox 15">
+                <a:extLst>
+                  <a:ext uri="{FF2B5EF4-FFF2-40B4-BE49-F238E27FC236}">
+                    <a16:creationId xmlns:a16="http://schemas.microsoft.com/office/drawing/2014/main" id="{C0581380-027F-7E39-C34C-B27D3FDD0F58}"/>
+                  </a:ext>
+                </a:extLst>
+              </p:cNvPr>
+              <p:cNvSpPr txBox="1"/>
+              <p:nvPr/>
+            </p:nvSpPr>
+            <p:spPr>
+              <a:xfrm>
+                <a:off x="5476835" y="2384623"/>
+                <a:ext cx="198772" cy="369332"/>
+              </a:xfrm>
+              <a:prstGeom prst="rect">
+                <a:avLst/>
+              </a:prstGeom>
+              <a:noFill/>
+            </p:spPr>
+            <p:txBody>
+              <a:bodyPr wrap="square" lIns="0" tIns="0" rIns="0" bIns="0" rtlCol="0">
+                <a:spAutoFit/>
+              </a:bodyPr>
+              <a:lstStyle/>
+              <a:p>
+                <a:pPr/>
+                <a14:m>
+                  <m:oMathPara xmlns:m="http://schemas.openxmlformats.org/officeDocument/2006/math">
+                    <m:oMathParaPr>
+                      <m:jc m:val="centerGroup"/>
+                    </m:oMathParaPr>
+                    <m:oMath xmlns:m="http://schemas.openxmlformats.org/officeDocument/2006/math">
+                      <m:r>
+                        <a:rPr lang="en-US" sz="2400" i="1">
+                          <a:latin typeface="Cambria Math" panose="02040503050406030204" pitchFamily="18" charset="0"/>
+                          <a:ea typeface="Cambria Math" panose="02040503050406030204" pitchFamily="18" charset="0"/>
+                        </a:rPr>
+                        <m:t>𝛾</m:t>
+                      </m:r>
+                    </m:oMath>
+                  </m:oMathPara>
+                </a14:m>
+                <a:endParaRPr lang="en-US" sz="2400" dirty="0"/>
+              </a:p>
+            </p:txBody>
+          </p:sp>
+        </mc:Choice>
+        <mc:Fallback>
+          <p:sp>
+            <p:nvSpPr>
+              <p:cNvPr id="16" name="TextBox 15">
+                <a:extLst>
+                  <a:ext uri="{FF2B5EF4-FFF2-40B4-BE49-F238E27FC236}">
+                    <a16:creationId xmlns:a16="http://schemas.microsoft.com/office/drawing/2014/main" id="{C0581380-027F-7E39-C34C-B27D3FDD0F58}"/>
+                  </a:ext>
+                </a:extLst>
+              </p:cNvPr>
+              <p:cNvSpPr txBox="1">
+                <a:spLocks noRot="1" noChangeAspect="1" noMove="1" noResize="1" noEditPoints="1" noAdjustHandles="1" noChangeArrowheads="1" noChangeShapeType="1" noTextEdit="1"/>
+              </p:cNvSpPr>
+              <p:nvPr/>
+            </p:nvSpPr>
+            <p:spPr>
+              <a:xfrm>
+                <a:off x="5476835" y="2384623"/>
+                <a:ext cx="198772" cy="369332"/>
+              </a:xfrm>
+              <a:prstGeom prst="rect">
+                <a:avLst/>
+              </a:prstGeom>
+              <a:blipFill>
+                <a:blip r:embed="rId5"/>
+                <a:stretch>
+                  <a:fillRect l="-43750" r="-43750" b="-23333"/>
+                </a:stretch>
+              </a:blipFill>
+            </p:spPr>
+            <p:txBody>
+              <a:bodyPr/>
+              <a:lstStyle/>
+              <a:p>
+                <a:r>
+                  <a:rPr lang="en-US">
+                    <a:noFill/>
+                  </a:rPr>
+                  <a:t> </a:t>
+                </a:r>
+              </a:p>
+            </p:txBody>
+          </p:sp>
+        </mc:Fallback>
+      </mc:AlternateContent>
+      <mc:AlternateContent xmlns:mc="http://schemas.openxmlformats.org/markup-compatibility/2006">
+        <mc:Choice xmlns:a14="http://schemas.microsoft.com/office/drawing/2010/main" Requires="a14">
+          <p:sp>
+            <p:nvSpPr>
+              <p:cNvPr id="17" name="TextBox 16">
+                <a:extLst>
+                  <a:ext uri="{FF2B5EF4-FFF2-40B4-BE49-F238E27FC236}">
+                    <a16:creationId xmlns:a16="http://schemas.microsoft.com/office/drawing/2014/main" id="{C810191C-FCEC-C524-5A2F-A7ACF4430BD2}"/>
+                  </a:ext>
+                </a:extLst>
+              </p:cNvPr>
+              <p:cNvSpPr txBox="1"/>
+              <p:nvPr/>
+            </p:nvSpPr>
+            <p:spPr>
+              <a:xfrm>
+                <a:off x="5438239" y="1647982"/>
+                <a:ext cx="216727" cy="738664"/>
+              </a:xfrm>
+              <a:prstGeom prst="rect">
+                <a:avLst/>
+              </a:prstGeom>
+              <a:noFill/>
+            </p:spPr>
+            <p:txBody>
+              <a:bodyPr wrap="square" lIns="0" tIns="0" rIns="0" bIns="0" rtlCol="0">
+                <a:spAutoFit/>
+              </a:bodyPr>
+              <a:lstStyle/>
+              <a:p>
+                <a:pPr/>
+                <a14:m>
+                  <m:oMathPara xmlns:m="http://schemas.openxmlformats.org/officeDocument/2006/math">
+                    <m:oMathParaPr>
+                      <m:jc m:val="centerGroup"/>
+                    </m:oMathParaPr>
+                    <m:oMath xmlns:m="http://schemas.openxmlformats.org/officeDocument/2006/math">
+                      <m:sSub>
+                        <m:sSubPr>
+                          <m:ctrlPr>
+                            <a:rPr lang="en-US" sz="2400" i="1">
+                              <a:latin typeface="Cambria Math" panose="02040503050406030204" pitchFamily="18" charset="0"/>
+                              <a:ea typeface="Cambria Math" panose="02040503050406030204" pitchFamily="18" charset="0"/>
+                            </a:rPr>
+                          </m:ctrlPr>
+                        </m:sSubPr>
+                        <m:e>
+                          <m:r>
+                            <a:rPr lang="en-US" sz="2400" i="1">
+                              <a:latin typeface="Cambria Math" panose="02040503050406030204" pitchFamily="18" charset="0"/>
+                              <a:ea typeface="Cambria Math" panose="02040503050406030204" pitchFamily="18" charset="0"/>
+                            </a:rPr>
+                            <m:t>𝛼</m:t>
+                          </m:r>
+                        </m:e>
+                        <m:sub>
+                          <m:r>
+                            <a:rPr lang="en-US" sz="2400" i="1">
+                              <a:latin typeface="Cambria Math" panose="02040503050406030204" pitchFamily="18" charset="0"/>
+                              <a:ea typeface="Cambria Math" panose="02040503050406030204" pitchFamily="18" charset="0"/>
+                            </a:rPr>
+                            <m:t>1</m:t>
+                          </m:r>
+                        </m:sub>
+                      </m:sSub>
+                    </m:oMath>
+                  </m:oMathPara>
+                </a14:m>
+                <a:endParaRPr lang="en-US" sz="2400" dirty="0">
+                  <a:ea typeface="Cambria Math" panose="02040503050406030204" pitchFamily="18" charset="0"/>
+                </a:endParaRPr>
+              </a:p>
+              <a:p>
+                <a:endParaRPr lang="en-US" sz="2400" dirty="0"/>
+              </a:p>
+            </p:txBody>
+          </p:sp>
+        </mc:Choice>
+        <mc:Fallback>
+          <p:sp>
+            <p:nvSpPr>
+              <p:cNvPr id="17" name="TextBox 16">
+                <a:extLst>
+                  <a:ext uri="{FF2B5EF4-FFF2-40B4-BE49-F238E27FC236}">
+                    <a16:creationId xmlns:a16="http://schemas.microsoft.com/office/drawing/2014/main" id="{C810191C-FCEC-C524-5A2F-A7ACF4430BD2}"/>
+                  </a:ext>
+                </a:extLst>
+              </p:cNvPr>
+              <p:cNvSpPr txBox="1">
+                <a:spLocks noRot="1" noChangeAspect="1" noMove="1" noResize="1" noEditPoints="1" noAdjustHandles="1" noChangeArrowheads="1" noChangeShapeType="1" noTextEdit="1"/>
+              </p:cNvSpPr>
+              <p:nvPr/>
+            </p:nvSpPr>
+            <p:spPr>
+              <a:xfrm>
+                <a:off x="5438239" y="1647982"/>
+                <a:ext cx="216727" cy="738664"/>
+              </a:xfrm>
+              <a:prstGeom prst="rect">
+                <a:avLst/>
+              </a:prstGeom>
+              <a:blipFill>
+                <a:blip r:embed="rId6"/>
+                <a:stretch>
+                  <a:fillRect l="-33333" r="-66667"/>
+                </a:stretch>
+              </a:blipFill>
+            </p:spPr>
+            <p:txBody>
+              <a:bodyPr/>
+              <a:lstStyle/>
+              <a:p>
+                <a:r>
+                  <a:rPr lang="en-US">
+                    <a:noFill/>
+                  </a:rPr>
+                  <a:t> </a:t>
+                </a:r>
+              </a:p>
+            </p:txBody>
+          </p:sp>
+        </mc:Fallback>
+      </mc:AlternateContent>
+      <p:sp>
+        <p:nvSpPr>
+          <p:cNvPr id="18" name="Rectangle 17">
+            <a:extLst>
+              <a:ext uri="{FF2B5EF4-FFF2-40B4-BE49-F238E27FC236}">
+                <a16:creationId xmlns:a16="http://schemas.microsoft.com/office/drawing/2014/main" id="{D32A1BD5-F851-867A-41ED-B40DEB472BAF}"/>
+              </a:ext>
+            </a:extLst>
+          </p:cNvPr>
+          <p:cNvSpPr/>
+          <p:nvPr/>
+        </p:nvSpPr>
+        <p:spPr>
+          <a:xfrm>
+            <a:off x="954844" y="4330805"/>
+            <a:ext cx="812800" cy="731188"/>
+          </a:xfrm>
+          <a:prstGeom prst="rect">
+            <a:avLst/>
+          </a:prstGeom>
+          <a:noFill/>
+        </p:spPr>
+        <p:style>
+          <a:lnRef idx="2">
+            <a:schemeClr val="accent1">
+              <a:shade val="15000"/>
+            </a:schemeClr>
+          </a:lnRef>
+          <a:fillRef idx="1">
+            <a:schemeClr val="accent1"/>
+          </a:fillRef>
+          <a:effectRef idx="0">
+            <a:schemeClr val="accent1"/>
+          </a:effectRef>
+          <a:fontRef idx="minor">
+            <a:schemeClr val="lt1"/>
+          </a:fontRef>
+        </p:style>
+        <p:txBody>
+          <a:bodyPr rtlCol="0" anchor="ctr"/>
+          <a:lstStyle/>
+          <a:p>
+            <a:pPr algn="ctr"/>
+            <a:r>
+              <a:rPr lang="en-US" sz="2400" dirty="0">
+                <a:solidFill>
+                  <a:schemeClr val="bg1">
+                    <a:lumMod val="10000"/>
+                  </a:schemeClr>
+                </a:solidFill>
+                <a:latin typeface="Times New Roman" panose="02020603050405020304" pitchFamily="18" charset="0"/>
+                <a:cs typeface="Times New Roman" panose="02020603050405020304" pitchFamily="18" charset="0"/>
+              </a:rPr>
+              <a:t>S2</a:t>
+            </a:r>
+          </a:p>
+        </p:txBody>
+      </p:sp>
+      <p:sp>
+        <p:nvSpPr>
+          <p:cNvPr id="19" name="Rectangle 18">
+            <a:extLst>
+              <a:ext uri="{FF2B5EF4-FFF2-40B4-BE49-F238E27FC236}">
+                <a16:creationId xmlns:a16="http://schemas.microsoft.com/office/drawing/2014/main" id="{19A5C8CC-5A7A-EB00-9965-20C64148F50C}"/>
+              </a:ext>
+            </a:extLst>
+          </p:cNvPr>
+          <p:cNvSpPr/>
+          <p:nvPr/>
+        </p:nvSpPr>
+        <p:spPr>
+          <a:xfrm>
+            <a:off x="2611453" y="4328306"/>
+            <a:ext cx="812800" cy="731188"/>
+          </a:xfrm>
+          <a:prstGeom prst="rect">
+            <a:avLst/>
+          </a:prstGeom>
+          <a:noFill/>
+        </p:spPr>
+        <p:style>
+          <a:lnRef idx="2">
+            <a:schemeClr val="accent1">
+              <a:shade val="15000"/>
+            </a:schemeClr>
+          </a:lnRef>
+          <a:fillRef idx="1">
+            <a:schemeClr val="accent1"/>
+          </a:fillRef>
+          <a:effectRef idx="0">
+            <a:schemeClr val="accent1"/>
+          </a:effectRef>
+          <a:fontRef idx="minor">
+            <a:schemeClr val="lt1"/>
+          </a:fontRef>
+        </p:style>
+        <p:txBody>
+          <a:bodyPr rtlCol="0" anchor="ctr"/>
+          <a:lstStyle/>
+          <a:p>
+            <a:pPr algn="ctr"/>
+            <a:r>
+              <a:rPr lang="en-US" sz="2400" dirty="0">
+                <a:solidFill>
+                  <a:schemeClr val="bg1">
+                    <a:lumMod val="10000"/>
+                  </a:schemeClr>
+                </a:solidFill>
+                <a:latin typeface="Times New Roman" panose="02020603050405020304" pitchFamily="18" charset="0"/>
+                <a:cs typeface="Times New Roman" panose="02020603050405020304" pitchFamily="18" charset="0"/>
+              </a:rPr>
+              <a:t>E2</a:t>
+            </a:r>
+          </a:p>
+        </p:txBody>
+      </p:sp>
+      <p:sp>
+        <p:nvSpPr>
+          <p:cNvPr id="20" name="Rectangle 19">
+            <a:extLst>
+              <a:ext uri="{FF2B5EF4-FFF2-40B4-BE49-F238E27FC236}">
+                <a16:creationId xmlns:a16="http://schemas.microsoft.com/office/drawing/2014/main" id="{CBA5E36E-FE81-730F-ECC3-21F5D061E179}"/>
+              </a:ext>
+            </a:extLst>
+          </p:cNvPr>
+          <p:cNvSpPr/>
+          <p:nvPr/>
+        </p:nvSpPr>
+        <p:spPr>
+          <a:xfrm>
+            <a:off x="4230423" y="4328023"/>
+            <a:ext cx="812800" cy="731188"/>
+          </a:xfrm>
+          <a:prstGeom prst="rect">
+            <a:avLst/>
+          </a:prstGeom>
+          <a:noFill/>
+        </p:spPr>
+        <p:style>
+          <a:lnRef idx="2">
+            <a:schemeClr val="accent1">
+              <a:shade val="15000"/>
+            </a:schemeClr>
+          </a:lnRef>
+          <a:fillRef idx="1">
+            <a:schemeClr val="accent1"/>
+          </a:fillRef>
+          <a:effectRef idx="0">
+            <a:schemeClr val="accent1"/>
+          </a:effectRef>
+          <a:fontRef idx="minor">
+            <a:schemeClr val="lt1"/>
+          </a:fontRef>
+        </p:style>
+        <p:txBody>
+          <a:bodyPr rtlCol="0" anchor="ctr"/>
+          <a:lstStyle/>
+          <a:p>
+            <a:pPr algn="ctr"/>
+            <a:r>
+              <a:rPr lang="en-US" sz="2400" dirty="0">
+                <a:solidFill>
+                  <a:schemeClr val="bg1">
+                    <a:lumMod val="10000"/>
+                  </a:schemeClr>
+                </a:solidFill>
+                <a:latin typeface="Times New Roman" panose="02020603050405020304" pitchFamily="18" charset="0"/>
+                <a:cs typeface="Times New Roman" panose="02020603050405020304" pitchFamily="18" charset="0"/>
+              </a:rPr>
+              <a:t>I2</a:t>
+            </a:r>
+          </a:p>
+        </p:txBody>
+      </p:sp>
+      <p:cxnSp>
+        <p:nvCxnSpPr>
+          <p:cNvPr id="23" name="Straight Arrow Connector 22">
+            <a:extLst>
+              <a:ext uri="{FF2B5EF4-FFF2-40B4-BE49-F238E27FC236}">
+                <a16:creationId xmlns:a16="http://schemas.microsoft.com/office/drawing/2014/main" id="{5A9407C4-A322-5B86-5740-D190647D584D}"/>
+              </a:ext>
+            </a:extLst>
+          </p:cNvPr>
+          <p:cNvCxnSpPr>
+            <a:cxnSpLocks/>
+            <a:stCxn id="18" idx="3"/>
+          </p:cNvCxnSpPr>
+          <p:nvPr/>
+        </p:nvCxnSpPr>
+        <p:spPr>
+          <a:xfrm>
+            <a:off x="1767645" y="4696399"/>
+            <a:ext cx="843809" cy="0"/>
+          </a:xfrm>
+          <a:prstGeom prst="straightConnector1">
+            <a:avLst/>
+          </a:prstGeom>
+          <a:ln>
+            <a:solidFill>
+              <a:schemeClr val="tx1">
+                <a:lumMod val="50000"/>
+              </a:schemeClr>
+            </a:solidFill>
+            <a:tailEnd type="triangle"/>
+          </a:ln>
+        </p:spPr>
+        <p:style>
+          <a:lnRef idx="1">
+            <a:schemeClr val="accent1"/>
+          </a:lnRef>
+          <a:fillRef idx="0">
+            <a:schemeClr val="accent1"/>
+          </a:fillRef>
+          <a:effectRef idx="0">
+            <a:schemeClr val="accent1"/>
+          </a:effectRef>
+          <a:fontRef idx="minor">
+            <a:schemeClr val="tx1"/>
+          </a:fontRef>
+        </p:style>
+      </p:cxnSp>
+      <p:cxnSp>
+        <p:nvCxnSpPr>
+          <p:cNvPr id="24" name="Straight Arrow Connector 23">
+            <a:extLst>
+              <a:ext uri="{FF2B5EF4-FFF2-40B4-BE49-F238E27FC236}">
+                <a16:creationId xmlns:a16="http://schemas.microsoft.com/office/drawing/2014/main" id="{2CA1A47E-BE7E-F7EE-3CAF-AD007DB0EC62}"/>
+              </a:ext>
+            </a:extLst>
+          </p:cNvPr>
+          <p:cNvCxnSpPr>
+            <a:cxnSpLocks/>
+            <a:stCxn id="19" idx="3"/>
+            <a:endCxn id="20" idx="1"/>
+          </p:cNvCxnSpPr>
+          <p:nvPr/>
+        </p:nvCxnSpPr>
+        <p:spPr>
+          <a:xfrm flipV="1">
+            <a:off x="3424254" y="4693617"/>
+            <a:ext cx="806169" cy="283"/>
+          </a:xfrm>
+          <a:prstGeom prst="straightConnector1">
+            <a:avLst/>
+          </a:prstGeom>
+          <a:ln>
+            <a:solidFill>
+              <a:schemeClr val="tx1">
+                <a:lumMod val="50000"/>
+              </a:schemeClr>
+            </a:solidFill>
+            <a:tailEnd type="triangle"/>
+          </a:ln>
+        </p:spPr>
+        <p:style>
+          <a:lnRef idx="1">
+            <a:schemeClr val="accent1"/>
+          </a:lnRef>
+          <a:fillRef idx="0">
+            <a:schemeClr val="accent1"/>
+          </a:fillRef>
+          <a:effectRef idx="0">
+            <a:schemeClr val="accent1"/>
+          </a:effectRef>
+          <a:fontRef idx="minor">
+            <a:schemeClr val="tx1"/>
+          </a:fontRef>
+        </p:style>
+      </p:cxnSp>
+      <mc:AlternateContent xmlns:mc="http://schemas.openxmlformats.org/markup-compatibility/2006">
+        <mc:Choice xmlns:a14="http://schemas.microsoft.com/office/drawing/2010/main" Requires="a14">
+          <p:sp>
+            <p:nvSpPr>
+              <p:cNvPr id="27" name="TextBox 26">
+                <a:extLst>
+                  <a:ext uri="{FF2B5EF4-FFF2-40B4-BE49-F238E27FC236}">
+                    <a16:creationId xmlns:a16="http://schemas.microsoft.com/office/drawing/2014/main" id="{F71F05FA-1B92-0B3F-F3B8-64B5BE94FC92}"/>
+                  </a:ext>
+                </a:extLst>
+              </p:cNvPr>
+              <p:cNvSpPr txBox="1"/>
+              <p:nvPr/>
+            </p:nvSpPr>
+            <p:spPr>
+              <a:xfrm>
+                <a:off x="1765530" y="4328024"/>
+                <a:ext cx="843809" cy="822469"/>
+              </a:xfrm>
+              <a:prstGeom prst="rect">
+                <a:avLst/>
+              </a:prstGeom>
+              <a:noFill/>
+            </p:spPr>
+            <p:txBody>
+              <a:bodyPr wrap="square" rtlCol="0">
+                <a:spAutoFit/>
+              </a:bodyPr>
+              <a:lstStyle/>
+              <a:p>
+                <a:pPr/>
+                <a14:m>
+                  <m:oMathPara xmlns:m="http://schemas.openxmlformats.org/officeDocument/2006/math">
+                    <m:oMathParaPr>
+                      <m:jc m:val="centerGroup"/>
+                    </m:oMathParaPr>
+                    <m:oMath xmlns:m="http://schemas.openxmlformats.org/officeDocument/2006/math">
+                      <m:r>
+                        <a:rPr lang="en-US" sz="2400" i="1">
+                          <a:latin typeface="Cambria Math" panose="02040503050406030204" pitchFamily="18" charset="0"/>
+                          <a:ea typeface="Cambria Math" panose="02040503050406030204" pitchFamily="18" charset="0"/>
+                        </a:rPr>
+                        <m:t>𝑠𝑠</m:t>
+                      </m:r>
+                      <m:r>
+                        <a:rPr lang="en-US" sz="2400" i="1">
+                          <a:latin typeface="Cambria Math" panose="02040503050406030204" pitchFamily="18" charset="0"/>
+                          <a:ea typeface="Cambria Math" panose="02040503050406030204" pitchFamily="18" charset="0"/>
+                        </a:rPr>
+                        <m:t> ∙</m:t>
+                      </m:r>
+                      <m:r>
+                        <a:rPr lang="en-US" sz="2400" i="1">
+                          <a:latin typeface="Cambria Math" panose="02040503050406030204" pitchFamily="18" charset="0"/>
+                          <a:ea typeface="Cambria Math" panose="02040503050406030204" pitchFamily="18" charset="0"/>
+                        </a:rPr>
+                        <m:t>𝜆</m:t>
+                      </m:r>
+                    </m:oMath>
+                  </m:oMathPara>
+                </a14:m>
+                <a:endParaRPr lang="en-US" sz="2400" dirty="0"/>
+              </a:p>
+            </p:txBody>
+          </p:sp>
+        </mc:Choice>
+        <mc:Fallback>
+          <p:sp>
+            <p:nvSpPr>
+              <p:cNvPr id="27" name="TextBox 26">
+                <a:extLst>
+                  <a:ext uri="{FF2B5EF4-FFF2-40B4-BE49-F238E27FC236}">
+                    <a16:creationId xmlns:a16="http://schemas.microsoft.com/office/drawing/2014/main" id="{F71F05FA-1B92-0B3F-F3B8-64B5BE94FC92}"/>
+                  </a:ext>
+                </a:extLst>
+              </p:cNvPr>
+              <p:cNvSpPr txBox="1">
+                <a:spLocks noRot="1" noChangeAspect="1" noMove="1" noResize="1" noEditPoints="1" noAdjustHandles="1" noChangeArrowheads="1" noChangeShapeType="1" noTextEdit="1"/>
+              </p:cNvSpPr>
+              <p:nvPr/>
+            </p:nvSpPr>
+            <p:spPr>
+              <a:xfrm>
+                <a:off x="1765530" y="4328024"/>
+                <a:ext cx="843809" cy="822469"/>
+              </a:xfrm>
+              <a:prstGeom prst="rect">
+                <a:avLst/>
+              </a:prstGeom>
+              <a:blipFill>
+                <a:blip r:embed="rId7"/>
+                <a:stretch>
+                  <a:fillRect/>
+                </a:stretch>
+              </a:blipFill>
+            </p:spPr>
+            <p:txBody>
+              <a:bodyPr/>
+              <a:lstStyle/>
+              <a:p>
+                <a:r>
+                  <a:rPr lang="en-US">
+                    <a:noFill/>
+                  </a:rPr>
+                  <a:t> </a:t>
+                </a:r>
+              </a:p>
+            </p:txBody>
+          </p:sp>
+        </mc:Fallback>
+      </mc:AlternateContent>
+      <mc:AlternateContent xmlns:mc="http://schemas.openxmlformats.org/markup-compatibility/2006">
+        <mc:Choice xmlns:a14="http://schemas.microsoft.com/office/drawing/2010/main" Requires="a14">
+          <p:sp>
+            <p:nvSpPr>
+              <p:cNvPr id="28" name="TextBox 27">
+                <a:extLst>
+                  <a:ext uri="{FF2B5EF4-FFF2-40B4-BE49-F238E27FC236}">
+                    <a16:creationId xmlns:a16="http://schemas.microsoft.com/office/drawing/2014/main" id="{9D5F548C-46CA-507B-E052-BE18A76F0D28}"/>
+                  </a:ext>
+                </a:extLst>
+              </p:cNvPr>
+              <p:cNvSpPr txBox="1"/>
+              <p:nvPr/>
+            </p:nvSpPr>
+            <p:spPr>
+              <a:xfrm>
+                <a:off x="3725171" y="4368582"/>
+                <a:ext cx="218864" cy="738664"/>
+              </a:xfrm>
+              <a:prstGeom prst="rect">
+                <a:avLst/>
+              </a:prstGeom>
+              <a:noFill/>
+            </p:spPr>
+            <p:txBody>
+              <a:bodyPr wrap="square" lIns="0" tIns="0" rIns="0" bIns="0" rtlCol="0">
+                <a:spAutoFit/>
+              </a:bodyPr>
+              <a:lstStyle/>
+              <a:p>
+                <a:pPr/>
+                <a14:m>
+                  <m:oMathPara xmlns:m="http://schemas.openxmlformats.org/officeDocument/2006/math">
+                    <m:oMathParaPr>
+                      <m:jc m:val="centerGroup"/>
+                    </m:oMathParaPr>
+                    <m:oMath xmlns:m="http://schemas.openxmlformats.org/officeDocument/2006/math">
+                      <m:r>
+                        <m:rPr>
+                          <m:sty m:val="p"/>
+                        </m:rPr>
+                        <a:rPr lang="en-US" sz="2400" i="1">
+                          <a:latin typeface="Cambria Math" panose="02040503050406030204" pitchFamily="18" charset="0"/>
+                        </a:rPr>
+                        <m:t>ϵ</m:t>
+                      </m:r>
+                    </m:oMath>
+                  </m:oMathPara>
+                </a14:m>
+                <a:endParaRPr lang="en-US" sz="2400" dirty="0"/>
+              </a:p>
+              <a:p>
+                <a:endParaRPr lang="en-US" sz="2400" dirty="0"/>
+              </a:p>
+            </p:txBody>
+          </p:sp>
+        </mc:Choice>
+        <mc:Fallback>
+          <p:sp>
+            <p:nvSpPr>
+              <p:cNvPr id="28" name="TextBox 27">
+                <a:extLst>
+                  <a:ext uri="{FF2B5EF4-FFF2-40B4-BE49-F238E27FC236}">
+                    <a16:creationId xmlns:a16="http://schemas.microsoft.com/office/drawing/2014/main" id="{9D5F548C-46CA-507B-E052-BE18A76F0D28}"/>
+                  </a:ext>
+                </a:extLst>
+              </p:cNvPr>
+              <p:cNvSpPr txBox="1">
+                <a:spLocks noRot="1" noChangeAspect="1" noMove="1" noResize="1" noEditPoints="1" noAdjustHandles="1" noChangeArrowheads="1" noChangeShapeType="1" noTextEdit="1"/>
+              </p:cNvSpPr>
+              <p:nvPr/>
+            </p:nvSpPr>
+            <p:spPr>
+              <a:xfrm>
+                <a:off x="3725171" y="4368582"/>
+                <a:ext cx="218864" cy="738664"/>
+              </a:xfrm>
+              <a:prstGeom prst="rect">
+                <a:avLst/>
+              </a:prstGeom>
+              <a:blipFill>
+                <a:blip r:embed="rId4"/>
+                <a:stretch>
+                  <a:fillRect l="-16667" r="-11111"/>
+                </a:stretch>
+              </a:blipFill>
+            </p:spPr>
+            <p:txBody>
+              <a:bodyPr/>
+              <a:lstStyle/>
+              <a:p>
+                <a:r>
+                  <a:rPr lang="en-US">
+                    <a:noFill/>
+                  </a:rPr>
+                  <a:t> </a:t>
+                </a:r>
+              </a:p>
+            </p:txBody>
+          </p:sp>
+        </mc:Fallback>
+      </mc:AlternateContent>
+      <p:cxnSp>
+        <p:nvCxnSpPr>
+          <p:cNvPr id="32" name="Elbow Connector 31">
+            <a:extLst>
+              <a:ext uri="{FF2B5EF4-FFF2-40B4-BE49-F238E27FC236}">
+                <a16:creationId xmlns:a16="http://schemas.microsoft.com/office/drawing/2014/main" id="{912DBB58-2721-0236-2F55-1FD7E794B785}"/>
+              </a:ext>
+            </a:extLst>
+          </p:cNvPr>
+          <p:cNvCxnSpPr>
+            <a:cxnSpLocks/>
+            <a:stCxn id="7" idx="2"/>
+            <a:endCxn id="18" idx="0"/>
+          </p:cNvCxnSpPr>
+          <p:nvPr/>
+        </p:nvCxnSpPr>
+        <p:spPr>
+          <a:xfrm rot="5400000">
+            <a:off x="3357711" y="1373399"/>
+            <a:ext cx="960940" cy="4953871"/>
+          </a:xfrm>
+          <a:prstGeom prst="bentConnector3">
+            <a:avLst>
+              <a:gd name="adj1" fmla="val 40132"/>
+            </a:avLst>
+          </a:prstGeom>
+          <a:ln>
+            <a:solidFill>
+              <a:schemeClr val="bg1">
+                <a:lumMod val="10000"/>
+              </a:schemeClr>
+            </a:solidFill>
+            <a:tailEnd type="triangle"/>
+          </a:ln>
+        </p:spPr>
+        <p:style>
+          <a:lnRef idx="1">
+            <a:schemeClr val="accent1"/>
+          </a:lnRef>
+          <a:fillRef idx="0">
+            <a:schemeClr val="accent1"/>
+          </a:fillRef>
+          <a:effectRef idx="0">
+            <a:schemeClr val="accent1"/>
+          </a:effectRef>
+          <a:fontRef idx="minor">
+            <a:schemeClr val="tx1"/>
+          </a:fontRef>
+        </p:style>
+      </p:cxnSp>
+      <mc:AlternateContent xmlns:mc="http://schemas.openxmlformats.org/markup-compatibility/2006">
+        <mc:Choice xmlns:a14="http://schemas.microsoft.com/office/drawing/2010/main" Requires="a14">
+          <p:sp>
+            <p:nvSpPr>
+              <p:cNvPr id="34" name="TextBox 33">
+                <a:extLst>
+                  <a:ext uri="{FF2B5EF4-FFF2-40B4-BE49-F238E27FC236}">
+                    <a16:creationId xmlns:a16="http://schemas.microsoft.com/office/drawing/2014/main" id="{6E112607-289C-7F49-12FB-050F315ADAD4}"/>
+                  </a:ext>
+                </a:extLst>
+              </p:cNvPr>
+              <p:cNvSpPr txBox="1"/>
+              <p:nvPr/>
+            </p:nvSpPr>
+            <p:spPr>
+              <a:xfrm>
+                <a:off x="4286040" y="3464440"/>
+                <a:ext cx="244683" cy="369332"/>
+              </a:xfrm>
+              <a:prstGeom prst="rect">
+                <a:avLst/>
+              </a:prstGeom>
+              <a:noFill/>
+            </p:spPr>
+            <p:txBody>
+              <a:bodyPr wrap="square" lIns="0" tIns="0" rIns="0" bIns="0" rtlCol="0">
+                <a:spAutoFit/>
+              </a:bodyPr>
+              <a:lstStyle/>
+              <a:p>
+                <a:pPr/>
+                <a14:m>
+                  <m:oMathPara xmlns:m="http://schemas.openxmlformats.org/officeDocument/2006/math">
+                    <m:oMathParaPr>
+                      <m:jc m:val="centerGroup"/>
+                    </m:oMathParaPr>
+                    <m:oMath xmlns:m="http://schemas.openxmlformats.org/officeDocument/2006/math">
+                      <m:r>
+                        <a:rPr lang="en-US" sz="2400" i="1">
+                          <a:latin typeface="Cambria Math" panose="02040503050406030204" pitchFamily="18" charset="0"/>
+                          <a:ea typeface="Cambria Math" panose="02040503050406030204" pitchFamily="18" charset="0"/>
+                        </a:rPr>
+                        <m:t>𝜔</m:t>
+                      </m:r>
+                    </m:oMath>
+                  </m:oMathPara>
+                </a14:m>
+                <a:endParaRPr lang="en-US" sz="2400" dirty="0"/>
+              </a:p>
+            </p:txBody>
+          </p:sp>
+        </mc:Choice>
+        <mc:Fallback>
+          <p:sp>
+            <p:nvSpPr>
+              <p:cNvPr id="34" name="TextBox 33">
+                <a:extLst>
+                  <a:ext uri="{FF2B5EF4-FFF2-40B4-BE49-F238E27FC236}">
+                    <a16:creationId xmlns:a16="http://schemas.microsoft.com/office/drawing/2014/main" id="{6E112607-289C-7F49-12FB-050F315ADAD4}"/>
+                  </a:ext>
+                </a:extLst>
+              </p:cNvPr>
+              <p:cNvSpPr txBox="1">
+                <a:spLocks noRot="1" noChangeAspect="1" noMove="1" noResize="1" noEditPoints="1" noAdjustHandles="1" noChangeArrowheads="1" noChangeShapeType="1" noTextEdit="1"/>
+              </p:cNvSpPr>
+              <p:nvPr/>
+            </p:nvSpPr>
+            <p:spPr>
+              <a:xfrm>
+                <a:off x="4286040" y="3464440"/>
+                <a:ext cx="244683" cy="369332"/>
+              </a:xfrm>
+              <a:prstGeom prst="rect">
+                <a:avLst/>
+              </a:prstGeom>
+              <a:blipFill>
+                <a:blip r:embed="rId8"/>
+                <a:stretch>
+                  <a:fillRect l="-25000" r="-25000"/>
+                </a:stretch>
+              </a:blipFill>
+            </p:spPr>
+            <p:txBody>
+              <a:bodyPr/>
+              <a:lstStyle/>
+              <a:p>
+                <a:r>
+                  <a:rPr lang="en-US">
+                    <a:noFill/>
+                  </a:rPr>
+                  <a:t> </a:t>
+                </a:r>
+              </a:p>
+            </p:txBody>
+          </p:sp>
+        </mc:Fallback>
+      </mc:AlternateContent>
+      <p:cxnSp>
+        <p:nvCxnSpPr>
+          <p:cNvPr id="62" name="Elbow Connector 61">
+            <a:extLst>
+              <a:ext uri="{FF2B5EF4-FFF2-40B4-BE49-F238E27FC236}">
+                <a16:creationId xmlns:a16="http://schemas.microsoft.com/office/drawing/2014/main" id="{7B002C33-0E3A-2C3F-2962-E8576CD66350}"/>
+              </a:ext>
+            </a:extLst>
+          </p:cNvPr>
+          <p:cNvCxnSpPr>
+            <a:cxnSpLocks/>
+            <a:stCxn id="55" idx="2"/>
+            <a:endCxn id="18" idx="2"/>
+          </p:cNvCxnSpPr>
+          <p:nvPr/>
+        </p:nvCxnSpPr>
+        <p:spPr>
+          <a:xfrm rot="5400000" flipH="1">
+            <a:off x="3505484" y="2917753"/>
+            <a:ext cx="679777" cy="4968256"/>
+          </a:xfrm>
+          <a:prstGeom prst="bentConnector3">
+            <a:avLst>
+              <a:gd name="adj1" fmla="val -72738"/>
+            </a:avLst>
+          </a:prstGeom>
+          <a:ln>
+            <a:solidFill>
+              <a:schemeClr val="tx1">
+                <a:lumMod val="50000"/>
+              </a:schemeClr>
+            </a:solidFill>
+            <a:tailEnd type="triangle"/>
+          </a:ln>
+        </p:spPr>
+        <p:style>
+          <a:lnRef idx="1">
+            <a:schemeClr val="accent1"/>
+          </a:lnRef>
+          <a:fillRef idx="0">
+            <a:schemeClr val="accent1"/>
+          </a:fillRef>
+          <a:effectRef idx="0">
+            <a:schemeClr val="accent1"/>
+          </a:effectRef>
+          <a:fontRef idx="minor">
+            <a:schemeClr val="tx1"/>
+          </a:fontRef>
+        </p:style>
+      </p:cxnSp>
+      <mc:AlternateContent xmlns:mc="http://schemas.openxmlformats.org/markup-compatibility/2006">
+        <mc:Choice xmlns:a14="http://schemas.microsoft.com/office/drawing/2010/main" Requires="a14">
+          <p:sp>
+            <p:nvSpPr>
+              <p:cNvPr id="206" name="TextBox 205">
+                <a:extLst>
+                  <a:ext uri="{FF2B5EF4-FFF2-40B4-BE49-F238E27FC236}">
+                    <a16:creationId xmlns:a16="http://schemas.microsoft.com/office/drawing/2014/main" id="{81EF9962-1FE1-3958-B845-2ABE5E856A9B}"/>
+                  </a:ext>
+                </a:extLst>
+              </p:cNvPr>
+              <p:cNvSpPr txBox="1"/>
+              <p:nvPr/>
+            </p:nvSpPr>
+            <p:spPr>
+              <a:xfrm>
+                <a:off x="3781561" y="5913044"/>
+                <a:ext cx="1256236" cy="369332"/>
+              </a:xfrm>
+              <a:prstGeom prst="rect">
+                <a:avLst/>
+              </a:prstGeom>
+              <a:noFill/>
+            </p:spPr>
+            <p:txBody>
+              <a:bodyPr wrap="square" lIns="0" tIns="0" rIns="0" bIns="0" rtlCol="0">
+                <a:spAutoFit/>
+              </a:bodyPr>
+              <a:lstStyle/>
+              <a:p>
+                <a:pPr/>
+                <a14:m>
+                  <m:oMathPara xmlns:m="http://schemas.openxmlformats.org/officeDocument/2006/math">
+                    <m:oMathParaPr>
+                      <m:jc m:val="centerGroup"/>
+                    </m:oMathParaPr>
+                    <m:oMath xmlns:m="http://schemas.openxmlformats.org/officeDocument/2006/math">
+                      <m:r>
+                        <a:rPr lang="en-US" sz="2400" i="1">
+                          <a:latin typeface="Cambria Math" panose="02040503050406030204" pitchFamily="18" charset="0"/>
+                          <a:ea typeface="Cambria Math" panose="02040503050406030204" pitchFamily="18" charset="0"/>
+                        </a:rPr>
+                        <m:t>𝑠𝑖</m:t>
+                      </m:r>
+                      <m:r>
+                        <a:rPr lang="en-US" sz="2400" i="1">
+                          <a:latin typeface="Cambria Math" panose="02040503050406030204" pitchFamily="18" charset="0"/>
+                          <a:ea typeface="Cambria Math" panose="02040503050406030204" pitchFamily="18" charset="0"/>
+                        </a:rPr>
+                        <m:t>∙</m:t>
+                      </m:r>
+                      <m:r>
+                        <a:rPr lang="en-US" sz="2400" i="1">
+                          <a:latin typeface="Cambria Math" panose="02040503050406030204" pitchFamily="18" charset="0"/>
+                          <a:ea typeface="Cambria Math" panose="02040503050406030204" pitchFamily="18" charset="0"/>
+                        </a:rPr>
+                        <m:t>𝜔</m:t>
+                      </m:r>
+                    </m:oMath>
+                  </m:oMathPara>
+                </a14:m>
+                <a:endParaRPr lang="en-US" sz="2400" dirty="0"/>
+              </a:p>
+            </p:txBody>
+          </p:sp>
+        </mc:Choice>
+        <mc:Fallback>
+          <p:sp>
+            <p:nvSpPr>
+              <p:cNvPr id="206" name="TextBox 205">
+                <a:extLst>
+                  <a:ext uri="{FF2B5EF4-FFF2-40B4-BE49-F238E27FC236}">
+                    <a16:creationId xmlns:a16="http://schemas.microsoft.com/office/drawing/2014/main" id="{81EF9962-1FE1-3958-B845-2ABE5E856A9B}"/>
+                  </a:ext>
+                </a:extLst>
+              </p:cNvPr>
+              <p:cNvSpPr txBox="1">
+                <a:spLocks noRot="1" noChangeAspect="1" noMove="1" noResize="1" noEditPoints="1" noAdjustHandles="1" noChangeArrowheads="1" noChangeShapeType="1" noTextEdit="1"/>
+              </p:cNvSpPr>
+              <p:nvPr/>
+            </p:nvSpPr>
+            <p:spPr>
+              <a:xfrm>
+                <a:off x="3781561" y="5913044"/>
+                <a:ext cx="1256236" cy="369332"/>
+              </a:xfrm>
+              <a:prstGeom prst="rect">
+                <a:avLst/>
+              </a:prstGeom>
+              <a:blipFill>
+                <a:blip r:embed="rId9"/>
+                <a:stretch>
+                  <a:fillRect b="-3333"/>
+                </a:stretch>
+              </a:blipFill>
+            </p:spPr>
+            <p:txBody>
+              <a:bodyPr/>
+              <a:lstStyle/>
+              <a:p>
+                <a:r>
+                  <a:rPr lang="en-US">
+                    <a:noFill/>
+                  </a:rPr>
+                  <a:t> </a:t>
+                </a:r>
+              </a:p>
+            </p:txBody>
+          </p:sp>
+        </mc:Fallback>
+      </mc:AlternateContent>
+      <p:cxnSp>
+        <p:nvCxnSpPr>
+          <p:cNvPr id="211" name="Straight Arrow Connector 210">
+            <a:extLst>
+              <a:ext uri="{FF2B5EF4-FFF2-40B4-BE49-F238E27FC236}">
+                <a16:creationId xmlns:a16="http://schemas.microsoft.com/office/drawing/2014/main" id="{6CC042A1-0473-499C-D273-30A30C53A6E1}"/>
+              </a:ext>
+            </a:extLst>
+          </p:cNvPr>
+          <p:cNvCxnSpPr>
+            <a:cxnSpLocks/>
+            <a:stCxn id="2" idx="2"/>
+          </p:cNvCxnSpPr>
+          <p:nvPr/>
+        </p:nvCxnSpPr>
+        <p:spPr>
+          <a:xfrm flipH="1">
+            <a:off x="972318" y="2700517"/>
+            <a:ext cx="385049" cy="340571"/>
+          </a:xfrm>
+          <a:prstGeom prst="straightConnector1">
+            <a:avLst/>
+          </a:prstGeom>
+          <a:ln>
+            <a:solidFill>
+              <a:schemeClr val="accent2">
+                <a:lumMod val="75000"/>
+              </a:schemeClr>
+            </a:solidFill>
+            <a:tailEnd type="triangle"/>
+          </a:ln>
+        </p:spPr>
+        <p:style>
+          <a:lnRef idx="1">
+            <a:schemeClr val="accent1"/>
+          </a:lnRef>
+          <a:fillRef idx="0">
+            <a:schemeClr val="accent1"/>
+          </a:fillRef>
+          <a:effectRef idx="0">
+            <a:schemeClr val="accent1"/>
+          </a:effectRef>
+          <a:fontRef idx="minor">
+            <a:schemeClr val="tx1"/>
+          </a:fontRef>
+        </p:style>
+      </p:cxnSp>
+      <mc:AlternateContent xmlns:mc="http://schemas.openxmlformats.org/markup-compatibility/2006">
+        <mc:Choice xmlns:a14="http://schemas.microsoft.com/office/drawing/2010/main" Requires="a14">
+          <p:sp>
+            <p:nvSpPr>
+              <p:cNvPr id="212" name="TextBox 211">
+                <a:extLst>
+                  <a:ext uri="{FF2B5EF4-FFF2-40B4-BE49-F238E27FC236}">
+                    <a16:creationId xmlns:a16="http://schemas.microsoft.com/office/drawing/2014/main" id="{234362A0-3F3A-6719-C429-A59A04F8E0DD}"/>
+                  </a:ext>
+                </a:extLst>
+              </p:cNvPr>
+              <p:cNvSpPr txBox="1"/>
+              <p:nvPr/>
+            </p:nvSpPr>
+            <p:spPr>
+              <a:xfrm>
+                <a:off x="1090954" y="2765134"/>
+                <a:ext cx="440548" cy="297454"/>
+              </a:xfrm>
+              <a:prstGeom prst="rect">
+                <a:avLst/>
+              </a:prstGeom>
+              <a:noFill/>
+            </p:spPr>
+            <p:txBody>
+              <a:bodyPr wrap="square" rtlCol="0">
+                <a:spAutoFit/>
+              </a:bodyPr>
+              <a:lstStyle/>
+              <a:p>
+                <a:pPr/>
+                <a14:m>
+                  <m:oMathPara xmlns:m="http://schemas.openxmlformats.org/officeDocument/2006/math">
+                    <m:oMathParaPr>
+                      <m:jc m:val="centerGroup"/>
+                    </m:oMathParaPr>
+                    <m:oMath xmlns:m="http://schemas.openxmlformats.org/officeDocument/2006/math">
+                      <m:r>
+                        <a:rPr lang="en-US" sz="1333" i="1" dirty="0" smtClean="0">
+                          <a:solidFill>
+                            <a:schemeClr val="accent1">
+                              <a:lumMod val="60000"/>
+                              <a:lumOff val="40000"/>
+                            </a:schemeClr>
+                          </a:solidFill>
+                          <a:latin typeface="Cambria Math" panose="02040503050406030204" pitchFamily="18" charset="0"/>
+                          <a:ea typeface="Cambria Math" panose="02040503050406030204" pitchFamily="18" charset="0"/>
+                        </a:rPr>
+                        <m:t>𝛿</m:t>
+                      </m:r>
+                    </m:oMath>
+                  </m:oMathPara>
+                </a14:m>
+                <a:endParaRPr lang="en-US" sz="1333" dirty="0">
+                  <a:solidFill>
+                    <a:schemeClr val="accent1">
+                      <a:lumMod val="60000"/>
+                      <a:lumOff val="40000"/>
+                    </a:schemeClr>
+                  </a:solidFill>
+                </a:endParaRPr>
+              </a:p>
+            </p:txBody>
+          </p:sp>
+        </mc:Choice>
+        <mc:Fallback>
+          <p:sp>
+            <p:nvSpPr>
+              <p:cNvPr id="212" name="TextBox 211">
+                <a:extLst>
+                  <a:ext uri="{FF2B5EF4-FFF2-40B4-BE49-F238E27FC236}">
+                    <a16:creationId xmlns:a16="http://schemas.microsoft.com/office/drawing/2014/main" id="{234362A0-3F3A-6719-C429-A59A04F8E0DD}"/>
+                  </a:ext>
+                </a:extLst>
+              </p:cNvPr>
+              <p:cNvSpPr txBox="1">
+                <a:spLocks noRot="1" noChangeAspect="1" noMove="1" noResize="1" noEditPoints="1" noAdjustHandles="1" noChangeArrowheads="1" noChangeShapeType="1" noTextEdit="1"/>
+              </p:cNvSpPr>
+              <p:nvPr/>
+            </p:nvSpPr>
+            <p:spPr>
+              <a:xfrm>
+                <a:off x="1090954" y="2765134"/>
+                <a:ext cx="440548" cy="297454"/>
+              </a:xfrm>
+              <a:prstGeom prst="rect">
+                <a:avLst/>
+              </a:prstGeom>
+              <a:blipFill>
+                <a:blip r:embed="rId10"/>
+                <a:stretch>
+                  <a:fillRect/>
+                </a:stretch>
+              </a:blipFill>
+            </p:spPr>
+            <p:txBody>
+              <a:bodyPr/>
+              <a:lstStyle/>
+              <a:p>
+                <a:r>
+                  <a:rPr lang="en-US">
+                    <a:noFill/>
+                  </a:rPr>
+                  <a:t> </a:t>
+                </a:r>
+              </a:p>
+            </p:txBody>
+          </p:sp>
+        </mc:Fallback>
+      </mc:AlternateContent>
+      <p:cxnSp>
+        <p:nvCxnSpPr>
+          <p:cNvPr id="217" name="Straight Arrow Connector 216">
+            <a:extLst>
+              <a:ext uri="{FF2B5EF4-FFF2-40B4-BE49-F238E27FC236}">
+                <a16:creationId xmlns:a16="http://schemas.microsoft.com/office/drawing/2014/main" id="{DA514A1A-C292-2664-B90C-C42ADF414023}"/>
+              </a:ext>
+            </a:extLst>
+          </p:cNvPr>
+          <p:cNvCxnSpPr>
+            <a:cxnSpLocks/>
+          </p:cNvCxnSpPr>
+          <p:nvPr/>
+        </p:nvCxnSpPr>
+        <p:spPr>
+          <a:xfrm flipH="1">
+            <a:off x="2650924" y="2713356"/>
+            <a:ext cx="385049" cy="340571"/>
+          </a:xfrm>
+          <a:prstGeom prst="straightConnector1">
+            <a:avLst/>
+          </a:prstGeom>
+          <a:ln>
+            <a:solidFill>
+              <a:schemeClr val="accent2">
+                <a:lumMod val="75000"/>
+              </a:schemeClr>
+            </a:solidFill>
+            <a:tailEnd type="triangle"/>
+          </a:ln>
+        </p:spPr>
+        <p:style>
+          <a:lnRef idx="1">
+            <a:schemeClr val="accent1"/>
+          </a:lnRef>
+          <a:fillRef idx="0">
+            <a:schemeClr val="accent1"/>
+          </a:fillRef>
+          <a:effectRef idx="0">
+            <a:schemeClr val="accent1"/>
+          </a:effectRef>
+          <a:fontRef idx="minor">
+            <a:schemeClr val="tx1"/>
+          </a:fontRef>
+        </p:style>
+      </p:cxnSp>
+      <mc:AlternateContent xmlns:mc="http://schemas.openxmlformats.org/markup-compatibility/2006">
+        <mc:Choice xmlns:a14="http://schemas.microsoft.com/office/drawing/2010/main" Requires="a14">
+          <p:sp>
+            <p:nvSpPr>
+              <p:cNvPr id="218" name="TextBox 217">
+                <a:extLst>
+                  <a:ext uri="{FF2B5EF4-FFF2-40B4-BE49-F238E27FC236}">
+                    <a16:creationId xmlns:a16="http://schemas.microsoft.com/office/drawing/2014/main" id="{F73C6C1C-4057-7A7C-7D7F-3C3DD10121E6}"/>
+                  </a:ext>
+                </a:extLst>
+              </p:cNvPr>
+              <p:cNvSpPr txBox="1"/>
+              <p:nvPr/>
+            </p:nvSpPr>
+            <p:spPr>
+              <a:xfrm>
+                <a:off x="2769559" y="2777972"/>
+                <a:ext cx="440548" cy="297454"/>
+              </a:xfrm>
+              <a:prstGeom prst="rect">
+                <a:avLst/>
+              </a:prstGeom>
+              <a:noFill/>
+            </p:spPr>
+            <p:txBody>
+              <a:bodyPr wrap="square" rtlCol="0">
+                <a:spAutoFit/>
+              </a:bodyPr>
+              <a:lstStyle/>
+              <a:p>
+                <a:pPr/>
+                <a14:m>
+                  <m:oMathPara xmlns:m="http://schemas.openxmlformats.org/officeDocument/2006/math">
+                    <m:oMathParaPr>
+                      <m:jc m:val="centerGroup"/>
+                    </m:oMathParaPr>
+                    <m:oMath xmlns:m="http://schemas.openxmlformats.org/officeDocument/2006/math">
+                      <m:r>
+                        <a:rPr lang="en-US" sz="1333" i="1" dirty="0" smtClean="0">
+                          <a:solidFill>
+                            <a:schemeClr val="accent1">
+                              <a:lumMod val="60000"/>
+                              <a:lumOff val="40000"/>
+                            </a:schemeClr>
+                          </a:solidFill>
+                          <a:latin typeface="Cambria Math" panose="02040503050406030204" pitchFamily="18" charset="0"/>
+                          <a:ea typeface="Cambria Math" panose="02040503050406030204" pitchFamily="18" charset="0"/>
+                        </a:rPr>
+                        <m:t>𝛿</m:t>
+                      </m:r>
+                    </m:oMath>
+                  </m:oMathPara>
+                </a14:m>
+                <a:endParaRPr lang="en-US" sz="1333" dirty="0">
+                  <a:solidFill>
+                    <a:schemeClr val="accent1">
+                      <a:lumMod val="60000"/>
+                      <a:lumOff val="40000"/>
+                    </a:schemeClr>
+                  </a:solidFill>
+                </a:endParaRPr>
+              </a:p>
+            </p:txBody>
+          </p:sp>
+        </mc:Choice>
+        <mc:Fallback>
+          <p:sp>
+            <p:nvSpPr>
+              <p:cNvPr id="218" name="TextBox 217">
+                <a:extLst>
+                  <a:ext uri="{FF2B5EF4-FFF2-40B4-BE49-F238E27FC236}">
+                    <a16:creationId xmlns:a16="http://schemas.microsoft.com/office/drawing/2014/main" id="{F73C6C1C-4057-7A7C-7D7F-3C3DD10121E6}"/>
+                  </a:ext>
+                </a:extLst>
+              </p:cNvPr>
+              <p:cNvSpPr txBox="1">
+                <a:spLocks noRot="1" noChangeAspect="1" noMove="1" noResize="1" noEditPoints="1" noAdjustHandles="1" noChangeArrowheads="1" noChangeShapeType="1" noTextEdit="1"/>
+              </p:cNvSpPr>
+              <p:nvPr/>
+            </p:nvSpPr>
+            <p:spPr>
+              <a:xfrm>
+                <a:off x="2769559" y="2777972"/>
+                <a:ext cx="440548" cy="297454"/>
+              </a:xfrm>
+              <a:prstGeom prst="rect">
+                <a:avLst/>
+              </a:prstGeom>
+              <a:blipFill>
+                <a:blip r:embed="rId10"/>
+                <a:stretch>
+                  <a:fillRect/>
+                </a:stretch>
+              </a:blipFill>
+            </p:spPr>
+            <p:txBody>
+              <a:bodyPr/>
+              <a:lstStyle/>
+              <a:p>
+                <a:r>
+                  <a:rPr lang="en-US">
+                    <a:noFill/>
+                  </a:rPr>
+                  <a:t> </a:t>
+                </a:r>
+              </a:p>
+            </p:txBody>
+          </p:sp>
+        </mc:Fallback>
+      </mc:AlternateContent>
+      <p:cxnSp>
+        <p:nvCxnSpPr>
+          <p:cNvPr id="219" name="Straight Arrow Connector 218">
+            <a:extLst>
+              <a:ext uri="{FF2B5EF4-FFF2-40B4-BE49-F238E27FC236}">
+                <a16:creationId xmlns:a16="http://schemas.microsoft.com/office/drawing/2014/main" id="{57EBDD8C-8510-43DA-99D2-5394E8AAE3CB}"/>
+              </a:ext>
+            </a:extLst>
+          </p:cNvPr>
+          <p:cNvCxnSpPr>
+            <a:cxnSpLocks/>
+          </p:cNvCxnSpPr>
+          <p:nvPr/>
+        </p:nvCxnSpPr>
+        <p:spPr>
+          <a:xfrm flipH="1">
+            <a:off x="4248228" y="2737387"/>
+            <a:ext cx="385049" cy="340571"/>
+          </a:xfrm>
+          <a:prstGeom prst="straightConnector1">
+            <a:avLst/>
+          </a:prstGeom>
+          <a:ln>
+            <a:solidFill>
+              <a:schemeClr val="accent2">
+                <a:lumMod val="75000"/>
+              </a:schemeClr>
+            </a:solidFill>
+            <a:tailEnd type="triangle"/>
+          </a:ln>
+        </p:spPr>
+        <p:style>
+          <a:lnRef idx="1">
+            <a:schemeClr val="accent1"/>
+          </a:lnRef>
+          <a:fillRef idx="0">
+            <a:schemeClr val="accent1"/>
+          </a:fillRef>
+          <a:effectRef idx="0">
+            <a:schemeClr val="accent1"/>
+          </a:effectRef>
+          <a:fontRef idx="minor">
+            <a:schemeClr val="tx1"/>
+          </a:fontRef>
+        </p:style>
+      </p:cxnSp>
+      <mc:AlternateContent xmlns:mc="http://schemas.openxmlformats.org/markup-compatibility/2006">
+        <mc:Choice xmlns:a14="http://schemas.microsoft.com/office/drawing/2010/main" Requires="a14">
+          <p:sp>
+            <p:nvSpPr>
+              <p:cNvPr id="220" name="TextBox 219">
+                <a:extLst>
+                  <a:ext uri="{FF2B5EF4-FFF2-40B4-BE49-F238E27FC236}">
+                    <a16:creationId xmlns:a16="http://schemas.microsoft.com/office/drawing/2014/main" id="{F98CC100-445B-0385-D097-0FBC3BDBCD8C}"/>
+                  </a:ext>
+                </a:extLst>
+              </p:cNvPr>
+              <p:cNvSpPr txBox="1"/>
+              <p:nvPr/>
+            </p:nvSpPr>
+            <p:spPr>
+              <a:xfrm>
+                <a:off x="4366863" y="2802003"/>
+                <a:ext cx="440548" cy="297454"/>
+              </a:xfrm>
+              <a:prstGeom prst="rect">
+                <a:avLst/>
+              </a:prstGeom>
+              <a:noFill/>
+            </p:spPr>
+            <p:txBody>
+              <a:bodyPr wrap="square" rtlCol="0">
+                <a:spAutoFit/>
+              </a:bodyPr>
+              <a:lstStyle/>
+              <a:p>
+                <a:pPr/>
+                <a14:m>
+                  <m:oMathPara xmlns:m="http://schemas.openxmlformats.org/officeDocument/2006/math">
+                    <m:oMathParaPr>
+                      <m:jc m:val="centerGroup"/>
+                    </m:oMathParaPr>
+                    <m:oMath xmlns:m="http://schemas.openxmlformats.org/officeDocument/2006/math">
+                      <m:r>
+                        <a:rPr lang="en-US" sz="1333" i="1" dirty="0" smtClean="0">
+                          <a:solidFill>
+                            <a:schemeClr val="accent1">
+                              <a:lumMod val="60000"/>
+                              <a:lumOff val="40000"/>
+                            </a:schemeClr>
+                          </a:solidFill>
+                          <a:latin typeface="Cambria Math" panose="02040503050406030204" pitchFamily="18" charset="0"/>
+                          <a:ea typeface="Cambria Math" panose="02040503050406030204" pitchFamily="18" charset="0"/>
+                        </a:rPr>
+                        <m:t>𝛿</m:t>
+                      </m:r>
+                    </m:oMath>
+                  </m:oMathPara>
+                </a14:m>
+                <a:endParaRPr lang="en-US" sz="1333" dirty="0">
+                  <a:solidFill>
+                    <a:schemeClr val="accent1">
+                      <a:lumMod val="60000"/>
+                      <a:lumOff val="40000"/>
+                    </a:schemeClr>
+                  </a:solidFill>
+                </a:endParaRPr>
+              </a:p>
+            </p:txBody>
+          </p:sp>
+        </mc:Choice>
+        <mc:Fallback>
+          <p:sp>
+            <p:nvSpPr>
+              <p:cNvPr id="220" name="TextBox 219">
+                <a:extLst>
+                  <a:ext uri="{FF2B5EF4-FFF2-40B4-BE49-F238E27FC236}">
+                    <a16:creationId xmlns:a16="http://schemas.microsoft.com/office/drawing/2014/main" id="{F98CC100-445B-0385-D097-0FBC3BDBCD8C}"/>
+                  </a:ext>
+                </a:extLst>
+              </p:cNvPr>
+              <p:cNvSpPr txBox="1">
+                <a:spLocks noRot="1" noChangeAspect="1" noMove="1" noResize="1" noEditPoints="1" noAdjustHandles="1" noChangeArrowheads="1" noChangeShapeType="1" noTextEdit="1"/>
+              </p:cNvSpPr>
+              <p:nvPr/>
+            </p:nvSpPr>
+            <p:spPr>
+              <a:xfrm>
+                <a:off x="4366863" y="2802003"/>
+                <a:ext cx="440548" cy="297454"/>
+              </a:xfrm>
+              <a:prstGeom prst="rect">
+                <a:avLst/>
+              </a:prstGeom>
+              <a:blipFill>
+                <a:blip r:embed="rId11"/>
+                <a:stretch>
+                  <a:fillRect/>
+                </a:stretch>
+              </a:blipFill>
+            </p:spPr>
+            <p:txBody>
+              <a:bodyPr/>
+              <a:lstStyle/>
+              <a:p>
+                <a:r>
+                  <a:rPr lang="en-US">
+                    <a:noFill/>
+                  </a:rPr>
+                  <a:t> </a:t>
+                </a:r>
+              </a:p>
+            </p:txBody>
+          </p:sp>
+        </mc:Fallback>
+      </mc:AlternateContent>
+      <p:cxnSp>
+        <p:nvCxnSpPr>
+          <p:cNvPr id="226" name="Straight Arrow Connector 225">
+            <a:extLst>
+              <a:ext uri="{FF2B5EF4-FFF2-40B4-BE49-F238E27FC236}">
+                <a16:creationId xmlns:a16="http://schemas.microsoft.com/office/drawing/2014/main" id="{B5A9B7E2-74FD-DBEA-34AA-5554CDFF60AE}"/>
+              </a:ext>
+            </a:extLst>
+          </p:cNvPr>
+          <p:cNvCxnSpPr>
+            <a:cxnSpLocks/>
+          </p:cNvCxnSpPr>
+          <p:nvPr/>
+        </p:nvCxnSpPr>
+        <p:spPr>
+          <a:xfrm flipH="1">
+            <a:off x="972318" y="5072679"/>
+            <a:ext cx="385049" cy="340571"/>
+          </a:xfrm>
+          <a:prstGeom prst="straightConnector1">
+            <a:avLst/>
+          </a:prstGeom>
+          <a:ln>
+            <a:solidFill>
+              <a:schemeClr val="accent2">
+                <a:lumMod val="75000"/>
+              </a:schemeClr>
+            </a:solidFill>
+            <a:tailEnd type="triangle"/>
+          </a:ln>
+        </p:spPr>
+        <p:style>
+          <a:lnRef idx="1">
+            <a:schemeClr val="accent1"/>
+          </a:lnRef>
+          <a:fillRef idx="0">
+            <a:schemeClr val="accent1"/>
+          </a:fillRef>
+          <a:effectRef idx="0">
+            <a:schemeClr val="accent1"/>
+          </a:effectRef>
+          <a:fontRef idx="minor">
+            <a:schemeClr val="tx1"/>
+          </a:fontRef>
+        </p:style>
+      </p:cxnSp>
+      <mc:AlternateContent xmlns:mc="http://schemas.openxmlformats.org/markup-compatibility/2006">
+        <mc:Choice xmlns:a14="http://schemas.microsoft.com/office/drawing/2010/main" Requires="a14">
+          <p:sp>
+            <p:nvSpPr>
+              <p:cNvPr id="227" name="TextBox 226">
+                <a:extLst>
+                  <a:ext uri="{FF2B5EF4-FFF2-40B4-BE49-F238E27FC236}">
+                    <a16:creationId xmlns:a16="http://schemas.microsoft.com/office/drawing/2014/main" id="{6EB01434-97CD-48BF-A9BB-906D900BD28E}"/>
+                  </a:ext>
+                </a:extLst>
+              </p:cNvPr>
+              <p:cNvSpPr txBox="1"/>
+              <p:nvPr/>
+            </p:nvSpPr>
+            <p:spPr>
+              <a:xfrm>
+                <a:off x="1023218" y="5137295"/>
+                <a:ext cx="440548" cy="297454"/>
+              </a:xfrm>
+              <a:prstGeom prst="rect">
+                <a:avLst/>
+              </a:prstGeom>
+              <a:noFill/>
+            </p:spPr>
+            <p:txBody>
+              <a:bodyPr wrap="square" rtlCol="0">
+                <a:spAutoFit/>
+              </a:bodyPr>
+              <a:lstStyle/>
+              <a:p>
+                <a:pPr/>
+                <a14:m>
+                  <m:oMathPara xmlns:m="http://schemas.openxmlformats.org/officeDocument/2006/math">
+                    <m:oMathParaPr>
+                      <m:jc m:val="centerGroup"/>
+                    </m:oMathParaPr>
+                    <m:oMath xmlns:m="http://schemas.openxmlformats.org/officeDocument/2006/math">
+                      <m:r>
+                        <a:rPr lang="en-US" sz="1333" i="1" dirty="0">
+                          <a:solidFill>
+                            <a:schemeClr val="accent1">
+                              <a:lumMod val="60000"/>
+                              <a:lumOff val="40000"/>
+                            </a:schemeClr>
+                          </a:solidFill>
+                          <a:latin typeface="Cambria Math" panose="02040503050406030204" pitchFamily="18" charset="0"/>
+                          <a:ea typeface="Cambria Math" panose="02040503050406030204" pitchFamily="18" charset="0"/>
+                        </a:rPr>
+                        <m:t>𝛿</m:t>
+                      </m:r>
+                    </m:oMath>
+                  </m:oMathPara>
+                </a14:m>
+                <a:endParaRPr lang="en-US" sz="1333" dirty="0">
+                  <a:solidFill>
+                    <a:schemeClr val="accent1">
+                      <a:lumMod val="60000"/>
+                      <a:lumOff val="40000"/>
+                    </a:schemeClr>
+                  </a:solidFill>
+                </a:endParaRPr>
+              </a:p>
+            </p:txBody>
+          </p:sp>
+        </mc:Choice>
+        <mc:Fallback>
+          <p:sp>
+            <p:nvSpPr>
+              <p:cNvPr id="227" name="TextBox 226">
+                <a:extLst>
+                  <a:ext uri="{FF2B5EF4-FFF2-40B4-BE49-F238E27FC236}">
+                    <a16:creationId xmlns:a16="http://schemas.microsoft.com/office/drawing/2014/main" id="{6EB01434-97CD-48BF-A9BB-906D900BD28E}"/>
+                  </a:ext>
+                </a:extLst>
+              </p:cNvPr>
+              <p:cNvSpPr txBox="1">
+                <a:spLocks noRot="1" noChangeAspect="1" noMove="1" noResize="1" noEditPoints="1" noAdjustHandles="1" noChangeArrowheads="1" noChangeShapeType="1" noTextEdit="1"/>
+              </p:cNvSpPr>
+              <p:nvPr/>
+            </p:nvSpPr>
+            <p:spPr>
+              <a:xfrm>
+                <a:off x="1023218" y="5137295"/>
+                <a:ext cx="440548" cy="297454"/>
+              </a:xfrm>
+              <a:prstGeom prst="rect">
+                <a:avLst/>
+              </a:prstGeom>
+              <a:blipFill>
+                <a:blip r:embed="rId12"/>
+                <a:stretch>
+                  <a:fillRect/>
+                </a:stretch>
+              </a:blipFill>
+            </p:spPr>
+            <p:txBody>
+              <a:bodyPr/>
+              <a:lstStyle/>
+              <a:p>
+                <a:r>
+                  <a:rPr lang="en-US">
+                    <a:noFill/>
+                  </a:rPr>
+                  <a:t> </a:t>
+                </a:r>
+              </a:p>
+            </p:txBody>
+          </p:sp>
+        </mc:Fallback>
+      </mc:AlternateContent>
+      <p:cxnSp>
+        <p:nvCxnSpPr>
+          <p:cNvPr id="228" name="Straight Arrow Connector 227">
+            <a:extLst>
+              <a:ext uri="{FF2B5EF4-FFF2-40B4-BE49-F238E27FC236}">
+                <a16:creationId xmlns:a16="http://schemas.microsoft.com/office/drawing/2014/main" id="{24263181-6436-DFD0-151E-FFB58228D9E9}"/>
+              </a:ext>
+            </a:extLst>
+          </p:cNvPr>
+          <p:cNvCxnSpPr>
+            <a:cxnSpLocks/>
+          </p:cNvCxnSpPr>
+          <p:nvPr/>
+        </p:nvCxnSpPr>
+        <p:spPr>
+          <a:xfrm flipH="1">
+            <a:off x="2650924" y="5065972"/>
+            <a:ext cx="385049" cy="340571"/>
+          </a:xfrm>
+          <a:prstGeom prst="straightConnector1">
+            <a:avLst/>
+          </a:prstGeom>
+          <a:ln>
+            <a:solidFill>
+              <a:schemeClr val="accent2">
+                <a:lumMod val="75000"/>
+              </a:schemeClr>
+            </a:solidFill>
+            <a:tailEnd type="triangle"/>
+          </a:ln>
+        </p:spPr>
+        <p:style>
+          <a:lnRef idx="1">
+            <a:schemeClr val="accent1"/>
+          </a:lnRef>
+          <a:fillRef idx="0">
+            <a:schemeClr val="accent1"/>
+          </a:fillRef>
+          <a:effectRef idx="0">
+            <a:schemeClr val="accent1"/>
+          </a:effectRef>
+          <a:fontRef idx="minor">
+            <a:schemeClr val="tx1"/>
+          </a:fontRef>
+        </p:style>
+      </p:cxnSp>
+      <mc:AlternateContent xmlns:mc="http://schemas.openxmlformats.org/markup-compatibility/2006">
+        <mc:Choice xmlns:a14="http://schemas.microsoft.com/office/drawing/2010/main" Requires="a14">
+          <p:sp>
+            <p:nvSpPr>
+              <p:cNvPr id="229" name="TextBox 228">
+                <a:extLst>
+                  <a:ext uri="{FF2B5EF4-FFF2-40B4-BE49-F238E27FC236}">
+                    <a16:creationId xmlns:a16="http://schemas.microsoft.com/office/drawing/2014/main" id="{BEF01057-1353-7B0A-3B61-FF27CFF9A310}"/>
+                  </a:ext>
+                </a:extLst>
+              </p:cNvPr>
+              <p:cNvSpPr txBox="1"/>
+              <p:nvPr/>
+            </p:nvSpPr>
+            <p:spPr>
+              <a:xfrm>
+                <a:off x="2769559" y="5130588"/>
+                <a:ext cx="440548" cy="297454"/>
+              </a:xfrm>
+              <a:prstGeom prst="rect">
+                <a:avLst/>
+              </a:prstGeom>
+              <a:noFill/>
+            </p:spPr>
+            <p:txBody>
+              <a:bodyPr wrap="square" rtlCol="0">
+                <a:spAutoFit/>
+              </a:bodyPr>
+              <a:lstStyle/>
+              <a:p>
+                <a:pPr/>
+                <a14:m>
+                  <m:oMathPara xmlns:m="http://schemas.openxmlformats.org/officeDocument/2006/math">
+                    <m:oMathParaPr>
+                      <m:jc m:val="centerGroup"/>
+                    </m:oMathParaPr>
+                    <m:oMath xmlns:m="http://schemas.openxmlformats.org/officeDocument/2006/math">
+                      <m:r>
+                        <a:rPr lang="en-US" sz="1333" i="1" dirty="0">
+                          <a:solidFill>
+                            <a:schemeClr val="accent1">
+                              <a:lumMod val="60000"/>
+                              <a:lumOff val="40000"/>
+                            </a:schemeClr>
+                          </a:solidFill>
+                          <a:latin typeface="Cambria Math" panose="02040503050406030204" pitchFamily="18" charset="0"/>
+                          <a:ea typeface="Cambria Math" panose="02040503050406030204" pitchFamily="18" charset="0"/>
+                        </a:rPr>
+                        <m:t>𝛿</m:t>
+                      </m:r>
+                    </m:oMath>
+                  </m:oMathPara>
+                </a14:m>
+                <a:endParaRPr lang="en-US" sz="1333" dirty="0">
+                  <a:solidFill>
+                    <a:schemeClr val="accent1">
+                      <a:lumMod val="60000"/>
+                      <a:lumOff val="40000"/>
+                    </a:schemeClr>
+                  </a:solidFill>
+                </a:endParaRPr>
+              </a:p>
+            </p:txBody>
+          </p:sp>
+        </mc:Choice>
+        <mc:Fallback>
+          <p:sp>
+            <p:nvSpPr>
+              <p:cNvPr id="229" name="TextBox 228">
+                <a:extLst>
+                  <a:ext uri="{FF2B5EF4-FFF2-40B4-BE49-F238E27FC236}">
+                    <a16:creationId xmlns:a16="http://schemas.microsoft.com/office/drawing/2014/main" id="{BEF01057-1353-7B0A-3B61-FF27CFF9A310}"/>
+                  </a:ext>
+                </a:extLst>
+              </p:cNvPr>
+              <p:cNvSpPr txBox="1">
+                <a:spLocks noRot="1" noChangeAspect="1" noMove="1" noResize="1" noEditPoints="1" noAdjustHandles="1" noChangeArrowheads="1" noChangeShapeType="1" noTextEdit="1"/>
+              </p:cNvSpPr>
+              <p:nvPr/>
+            </p:nvSpPr>
+            <p:spPr>
+              <a:xfrm>
+                <a:off x="2769559" y="5130588"/>
+                <a:ext cx="440548" cy="297454"/>
+              </a:xfrm>
+              <a:prstGeom prst="rect">
+                <a:avLst/>
+              </a:prstGeom>
+              <a:blipFill>
+                <a:blip r:embed="rId13"/>
+                <a:stretch>
+                  <a:fillRect/>
+                </a:stretch>
+              </a:blipFill>
+            </p:spPr>
+            <p:txBody>
+              <a:bodyPr/>
+              <a:lstStyle/>
+              <a:p>
+                <a:r>
+                  <a:rPr lang="en-US">
+                    <a:noFill/>
+                  </a:rPr>
+                  <a:t> </a:t>
+                </a:r>
+              </a:p>
+            </p:txBody>
+          </p:sp>
+        </mc:Fallback>
+      </mc:AlternateContent>
+      <p:cxnSp>
+        <p:nvCxnSpPr>
+          <p:cNvPr id="230" name="Straight Arrow Connector 229">
+            <a:extLst>
+              <a:ext uri="{FF2B5EF4-FFF2-40B4-BE49-F238E27FC236}">
+                <a16:creationId xmlns:a16="http://schemas.microsoft.com/office/drawing/2014/main" id="{11854936-912C-19B9-0EDA-2DAF557F989A}"/>
+              </a:ext>
+            </a:extLst>
+          </p:cNvPr>
+          <p:cNvCxnSpPr>
+            <a:cxnSpLocks/>
+          </p:cNvCxnSpPr>
+          <p:nvPr/>
+        </p:nvCxnSpPr>
+        <p:spPr>
+          <a:xfrm flipH="1">
+            <a:off x="4248228" y="5060907"/>
+            <a:ext cx="385049" cy="340571"/>
+          </a:xfrm>
+          <a:prstGeom prst="straightConnector1">
+            <a:avLst/>
+          </a:prstGeom>
+          <a:ln>
+            <a:solidFill>
+              <a:schemeClr val="accent2">
+                <a:lumMod val="75000"/>
+              </a:schemeClr>
+            </a:solidFill>
+            <a:tailEnd type="triangle"/>
+          </a:ln>
+        </p:spPr>
+        <p:style>
+          <a:lnRef idx="1">
+            <a:schemeClr val="accent1"/>
+          </a:lnRef>
+          <a:fillRef idx="0">
+            <a:schemeClr val="accent1"/>
+          </a:fillRef>
+          <a:effectRef idx="0">
+            <a:schemeClr val="accent1"/>
+          </a:effectRef>
+          <a:fontRef idx="minor">
+            <a:schemeClr val="tx1"/>
+          </a:fontRef>
+        </p:style>
+      </p:cxnSp>
+      <mc:AlternateContent xmlns:mc="http://schemas.openxmlformats.org/markup-compatibility/2006">
+        <mc:Choice xmlns:a14="http://schemas.microsoft.com/office/drawing/2010/main" Requires="a14">
+          <p:sp>
+            <p:nvSpPr>
+              <p:cNvPr id="231" name="TextBox 230">
+                <a:extLst>
+                  <a:ext uri="{FF2B5EF4-FFF2-40B4-BE49-F238E27FC236}">
+                    <a16:creationId xmlns:a16="http://schemas.microsoft.com/office/drawing/2014/main" id="{75081138-AD91-88C7-C7F0-73AB2D44DD3E}"/>
+                  </a:ext>
+                </a:extLst>
+              </p:cNvPr>
+              <p:cNvSpPr txBox="1"/>
+              <p:nvPr/>
+            </p:nvSpPr>
+            <p:spPr>
+              <a:xfrm>
+                <a:off x="4366863" y="5125523"/>
+                <a:ext cx="440548" cy="297454"/>
+              </a:xfrm>
+              <a:prstGeom prst="rect">
+                <a:avLst/>
+              </a:prstGeom>
+              <a:noFill/>
+            </p:spPr>
+            <p:txBody>
+              <a:bodyPr wrap="square" rtlCol="0">
+                <a:spAutoFit/>
+              </a:bodyPr>
+              <a:lstStyle/>
+              <a:p>
+                <a:pPr/>
+                <a14:m>
+                  <m:oMathPara xmlns:m="http://schemas.openxmlformats.org/officeDocument/2006/math">
+                    <m:oMathParaPr>
+                      <m:jc m:val="centerGroup"/>
+                    </m:oMathParaPr>
+                    <m:oMath xmlns:m="http://schemas.openxmlformats.org/officeDocument/2006/math">
+                      <m:r>
+                        <a:rPr lang="en-US" sz="1333" i="1" dirty="0">
+                          <a:solidFill>
+                            <a:schemeClr val="accent1">
+                              <a:lumMod val="60000"/>
+                              <a:lumOff val="40000"/>
+                            </a:schemeClr>
+                          </a:solidFill>
+                          <a:latin typeface="Cambria Math" panose="02040503050406030204" pitchFamily="18" charset="0"/>
+                          <a:ea typeface="Cambria Math" panose="02040503050406030204" pitchFamily="18" charset="0"/>
+                        </a:rPr>
+                        <m:t>𝛿</m:t>
+                      </m:r>
+                    </m:oMath>
+                  </m:oMathPara>
+                </a14:m>
+                <a:endParaRPr lang="en-US" sz="1333" dirty="0">
+                  <a:solidFill>
+                    <a:schemeClr val="accent1">
+                      <a:lumMod val="60000"/>
+                      <a:lumOff val="40000"/>
+                    </a:schemeClr>
+                  </a:solidFill>
+                </a:endParaRPr>
+              </a:p>
+            </p:txBody>
+          </p:sp>
+        </mc:Choice>
+        <mc:Fallback>
+          <p:sp>
+            <p:nvSpPr>
+              <p:cNvPr id="231" name="TextBox 230">
+                <a:extLst>
+                  <a:ext uri="{FF2B5EF4-FFF2-40B4-BE49-F238E27FC236}">
+                    <a16:creationId xmlns:a16="http://schemas.microsoft.com/office/drawing/2014/main" id="{75081138-AD91-88C7-C7F0-73AB2D44DD3E}"/>
+                  </a:ext>
+                </a:extLst>
+              </p:cNvPr>
+              <p:cNvSpPr txBox="1">
+                <a:spLocks noRot="1" noChangeAspect="1" noMove="1" noResize="1" noEditPoints="1" noAdjustHandles="1" noChangeArrowheads="1" noChangeShapeType="1" noTextEdit="1"/>
+              </p:cNvSpPr>
+              <p:nvPr/>
+            </p:nvSpPr>
+            <p:spPr>
+              <a:xfrm>
+                <a:off x="4366863" y="5125523"/>
+                <a:ext cx="440548" cy="297454"/>
+              </a:xfrm>
+              <a:prstGeom prst="rect">
+                <a:avLst/>
+              </a:prstGeom>
+              <a:blipFill>
+                <a:blip r:embed="rId14"/>
+                <a:stretch>
+                  <a:fillRect/>
+                </a:stretch>
+              </a:blipFill>
+            </p:spPr>
+            <p:txBody>
+              <a:bodyPr/>
+              <a:lstStyle/>
+              <a:p>
+                <a:r>
+                  <a:rPr lang="en-US">
+                    <a:noFill/>
+                  </a:rPr>
+                  <a:t> </a:t>
+                </a:r>
+              </a:p>
+            </p:txBody>
+          </p:sp>
+        </mc:Fallback>
+      </mc:AlternateContent>
+      <mc:AlternateContent xmlns:mc="http://schemas.openxmlformats.org/markup-compatibility/2006">
+        <mc:Choice xmlns:a14="http://schemas.microsoft.com/office/drawing/2010/main" Requires="a14">
+          <p:sp>
+            <p:nvSpPr>
+              <p:cNvPr id="39" name="TextBox 38">
+                <a:extLst>
+                  <a:ext uri="{FF2B5EF4-FFF2-40B4-BE49-F238E27FC236}">
+                    <a16:creationId xmlns:a16="http://schemas.microsoft.com/office/drawing/2014/main" id="{6AC5ECAB-1D67-A3C8-2B09-37583778D8F8}"/>
+                  </a:ext>
+                </a:extLst>
+              </p:cNvPr>
+              <p:cNvSpPr txBox="1"/>
+              <p:nvPr/>
+            </p:nvSpPr>
+            <p:spPr>
+              <a:xfrm>
+                <a:off x="7845953" y="1937301"/>
+                <a:ext cx="3560911" cy="6001643"/>
+              </a:xfrm>
+              <a:prstGeom prst="rect">
+                <a:avLst/>
+              </a:prstGeom>
+              <a:noFill/>
+            </p:spPr>
+            <p:txBody>
+              <a:bodyPr wrap="none" rtlCol="0">
+                <a:spAutoFit/>
+              </a:bodyPr>
+              <a:lstStyle/>
+              <a:p>
+                <a14:m>
+                  <m:oMath xmlns:m="http://schemas.openxmlformats.org/officeDocument/2006/math">
+                    <m:r>
+                      <a:rPr lang="en-US" sz="2400" i="1">
+                        <a:latin typeface="Cambria Math" panose="02040503050406030204" pitchFamily="18" charset="0"/>
+                      </a:rPr>
+                      <m:t>𝜆</m:t>
+                    </m:r>
+                    <m:r>
+                      <a:rPr lang="en-US" sz="2400" i="1">
+                        <a:latin typeface="Cambria Math" panose="02040503050406030204" pitchFamily="18" charset="0"/>
+                      </a:rPr>
+                      <m:t>:</m:t>
+                    </m:r>
+                  </m:oMath>
+                </a14:m>
+                <a:r>
+                  <a:rPr lang="en-US" sz="2400" dirty="0"/>
+                  <a:t> </a:t>
+                </a:r>
+                <a:r>
+                  <a:rPr lang="en-US" sz="2400" dirty="0">
+                    <a:latin typeface="Cambria Math" panose="02040503050406030204" pitchFamily="18" charset="0"/>
+                    <a:ea typeface="Cambria Math" panose="02040503050406030204" pitchFamily="18" charset="0"/>
+                  </a:rPr>
+                  <a:t>force of infection</a:t>
+                </a:r>
+              </a:p>
+              <a:p>
+                <a14:m>
+                  <m:oMath xmlns:m="http://schemas.openxmlformats.org/officeDocument/2006/math">
+                    <m:r>
+                      <a:rPr lang="en-US" sz="2400" i="1">
+                        <a:latin typeface="Cambria Math" panose="02040503050406030204" pitchFamily="18" charset="0"/>
+                        <a:ea typeface="Cambria Math" panose="02040503050406030204" pitchFamily="18" charset="0"/>
+                      </a:rPr>
+                      <m:t>𝑣</m:t>
+                    </m:r>
+                    <m:r>
+                      <a:rPr lang="en-US" sz="2400" i="1">
+                        <a:latin typeface="Cambria Math" panose="02040503050406030204" pitchFamily="18" charset="0"/>
+                        <a:ea typeface="Cambria Math" panose="02040503050406030204" pitchFamily="18" charset="0"/>
+                      </a:rPr>
+                      <m:t>(</m:t>
+                    </m:r>
+                    <m:r>
+                      <a:rPr lang="en-US" sz="2400" i="1">
+                        <a:latin typeface="Cambria Math" panose="02040503050406030204" pitchFamily="18" charset="0"/>
+                        <a:ea typeface="Cambria Math" panose="02040503050406030204" pitchFamily="18" charset="0"/>
+                      </a:rPr>
+                      <m:t>𝑡</m:t>
+                    </m:r>
+                    <m:r>
+                      <a:rPr lang="en-US" sz="2400" i="1">
+                        <a:latin typeface="Cambria Math" panose="02040503050406030204" pitchFamily="18" charset="0"/>
+                        <a:ea typeface="Cambria Math" panose="02040503050406030204" pitchFamily="18" charset="0"/>
+                      </a:rPr>
+                      <m:t>)</m:t>
+                    </m:r>
+                  </m:oMath>
+                </a14:m>
+                <a:r>
+                  <a:rPr lang="en-US" sz="2400" dirty="0">
+                    <a:latin typeface="Cambria Math" panose="02040503050406030204" pitchFamily="18" charset="0"/>
+                    <a:ea typeface="Cambria Math" panose="02040503050406030204" pitchFamily="18" charset="0"/>
+                  </a:rPr>
+                  <a:t>: vaccination function</a:t>
+                </a:r>
+              </a:p>
+              <a:p>
+                <a14:m>
+                  <m:oMath xmlns:m="http://schemas.openxmlformats.org/officeDocument/2006/math">
+                    <m:r>
+                      <a:rPr lang="en-US" sz="2400" i="1">
+                        <a:latin typeface="Cambria Math" panose="02040503050406030204" pitchFamily="18" charset="0"/>
+                        <a:ea typeface="Cambria Math" panose="02040503050406030204" pitchFamily="18" charset="0"/>
+                      </a:rPr>
+                      <m:t>𝜖</m:t>
+                    </m:r>
+                  </m:oMath>
+                </a14:m>
+                <a:r>
+                  <a:rPr lang="en-US" sz="2400" dirty="0">
+                    <a:latin typeface="Cambria Math" panose="02040503050406030204" pitchFamily="18" charset="0"/>
+                    <a:ea typeface="Cambria Math" panose="02040503050406030204" pitchFamily="18" charset="0"/>
+                  </a:rPr>
+                  <a:t>: latent period</a:t>
+                </a:r>
+              </a:p>
+              <a:p>
+                <a14:m>
+                  <m:oMath xmlns:m="http://schemas.openxmlformats.org/officeDocument/2006/math">
+                    <m:r>
+                      <m:rPr>
+                        <m:sty m:val="p"/>
+                      </m:rPr>
+                      <a:rPr lang="en-US" sz="2400" i="1">
+                        <a:latin typeface="Cambria Math" panose="02040503050406030204" pitchFamily="18" charset="0"/>
+                        <a:ea typeface="Cambria Math" panose="02040503050406030204" pitchFamily="18" charset="0"/>
+                      </a:rPr>
+                      <m:t>γ</m:t>
+                    </m:r>
+                  </m:oMath>
+                </a14:m>
+                <a:r>
+                  <a:rPr lang="en-US" sz="2400" dirty="0">
+                    <a:latin typeface="Cambria Math" panose="02040503050406030204" pitchFamily="18" charset="0"/>
+                    <a:ea typeface="Cambria Math" panose="02040503050406030204" pitchFamily="18" charset="0"/>
+                  </a:rPr>
+                  <a:t>: recovery rate</a:t>
+                </a:r>
+              </a:p>
+              <a:p>
+                <a14:m>
+                  <m:oMath xmlns:m="http://schemas.openxmlformats.org/officeDocument/2006/math">
+                    <m:r>
+                      <m:rPr>
+                        <m:sty m:val="p"/>
+                      </m:rPr>
+                      <a:rPr lang="en-US" sz="2400" i="1">
+                        <a:latin typeface="Cambria Math" panose="02040503050406030204" pitchFamily="18" charset="0"/>
+                        <a:ea typeface="Cambria Math" panose="02040503050406030204" pitchFamily="18" charset="0"/>
+                      </a:rPr>
+                      <m:t>α</m:t>
+                    </m:r>
+                  </m:oMath>
+                </a14:m>
+                <a:r>
+                  <a:rPr lang="en-US" sz="2400" dirty="0">
+                    <a:latin typeface="Cambria Math" panose="02040503050406030204" pitchFamily="18" charset="0"/>
+                    <a:ea typeface="Cambria Math" panose="02040503050406030204" pitchFamily="18" charset="0"/>
+                  </a:rPr>
+                  <a:t>: death rate</a:t>
+                </a:r>
+              </a:p>
+              <a:p>
+                <a14:m>
+                  <m:oMath xmlns:m="http://schemas.openxmlformats.org/officeDocument/2006/math">
+                    <m:r>
+                      <m:rPr>
+                        <m:sty m:val="p"/>
+                      </m:rPr>
+                      <a:rPr lang="en-US" sz="2400" i="1">
+                        <a:latin typeface="Cambria Math" panose="02040503050406030204" pitchFamily="18" charset="0"/>
+                        <a:ea typeface="Cambria Math" panose="02040503050406030204" pitchFamily="18" charset="0"/>
+                      </a:rPr>
+                      <m:t>ω</m:t>
+                    </m:r>
+                  </m:oMath>
+                </a14:m>
+                <a:r>
+                  <a:rPr lang="en-US" sz="2400" dirty="0">
+                    <a:latin typeface="Cambria Math" panose="02040503050406030204" pitchFamily="18" charset="0"/>
+                    <a:ea typeface="Cambria Math" panose="02040503050406030204" pitchFamily="18" charset="0"/>
+                  </a:rPr>
+                  <a:t>: waning of immunity</a:t>
+                </a:r>
+              </a:p>
+              <a:p>
+                <a14:m>
+                  <m:oMath xmlns:m="http://schemas.openxmlformats.org/officeDocument/2006/math">
+                    <m:r>
+                      <a:rPr lang="en-US" sz="2400" i="1">
+                        <a:latin typeface="Cambria Math" panose="02040503050406030204" pitchFamily="18" charset="0"/>
+                        <a:ea typeface="Cambria Math" panose="02040503050406030204" pitchFamily="18" charset="0"/>
+                      </a:rPr>
+                      <m:t>𝑠𝑠</m:t>
+                    </m:r>
+                  </m:oMath>
+                </a14:m>
+                <a:r>
+                  <a:rPr lang="en-US" sz="2400" dirty="0">
+                    <a:latin typeface="Cambria Math" panose="02040503050406030204" pitchFamily="18" charset="0"/>
+                    <a:ea typeface="Cambria Math" panose="02040503050406030204" pitchFamily="18" charset="0"/>
+                  </a:rPr>
+                  <a:t>: scale susceptibility</a:t>
+                </a:r>
+              </a:p>
+              <a:p>
+                <a14:m>
+                  <m:oMath xmlns:m="http://schemas.openxmlformats.org/officeDocument/2006/math">
+                    <m:r>
+                      <a:rPr lang="en-US" sz="2400" i="1">
+                        <a:latin typeface="Cambria Math" panose="02040503050406030204" pitchFamily="18" charset="0"/>
+                        <a:ea typeface="Cambria Math" panose="02040503050406030204" pitchFamily="18" charset="0"/>
+                      </a:rPr>
+                      <m:t>𝑠𝑖</m:t>
+                    </m:r>
+                  </m:oMath>
+                </a14:m>
+                <a:r>
+                  <a:rPr lang="en-US" sz="2400" dirty="0">
+                    <a:latin typeface="Cambria Math" panose="02040503050406030204" pitchFamily="18" charset="0"/>
+                    <a:ea typeface="Cambria Math" panose="02040503050406030204" pitchFamily="18" charset="0"/>
+                  </a:rPr>
+                  <a:t>: scale immunity</a:t>
+                </a:r>
+              </a:p>
+              <a:p>
+                <a14:m>
+                  <m:oMath xmlns:m="http://schemas.openxmlformats.org/officeDocument/2006/math">
+                    <m:r>
+                      <a:rPr lang="en-US" sz="2400" i="1">
+                        <a:latin typeface="Cambria Math" panose="02040503050406030204" pitchFamily="18" charset="0"/>
+                        <a:ea typeface="Cambria Math" panose="02040503050406030204" pitchFamily="18" charset="0"/>
+                      </a:rPr>
+                      <m:t>𝛿</m:t>
+                    </m:r>
+                  </m:oMath>
+                </a14:m>
+                <a:r>
+                  <a:rPr lang="en-US" sz="2400" dirty="0">
+                    <a:latin typeface="Cambria Math" panose="02040503050406030204" pitchFamily="18" charset="0"/>
+                    <a:ea typeface="Cambria Math" panose="02040503050406030204" pitchFamily="18" charset="0"/>
+                  </a:rPr>
+                  <a:t>: aging rate</a:t>
+                </a:r>
+              </a:p>
+              <a:p>
+                <a:endParaRPr lang="en-US" sz="2400" dirty="0">
+                  <a:latin typeface="Cambria Math" panose="02040503050406030204" pitchFamily="18" charset="0"/>
+                  <a:ea typeface="Cambria Math" panose="02040503050406030204" pitchFamily="18" charset="0"/>
+                </a:endParaRPr>
+              </a:p>
+              <a:p>
+                <a:endParaRPr lang="en-US" sz="2400" dirty="0">
+                  <a:latin typeface="Cambria Math" panose="02040503050406030204" pitchFamily="18" charset="0"/>
+                  <a:ea typeface="Cambria Math" panose="02040503050406030204" pitchFamily="18" charset="0"/>
+                </a:endParaRPr>
+              </a:p>
+              <a:p>
+                <a:endParaRPr lang="en-US" sz="2400" dirty="0">
+                  <a:latin typeface="Cambria Math" panose="02040503050406030204" pitchFamily="18" charset="0"/>
+                  <a:ea typeface="Cambria Math" panose="02040503050406030204" pitchFamily="18" charset="0"/>
+                </a:endParaRPr>
+              </a:p>
+              <a:p>
+                <a:endParaRPr lang="en-US" sz="2400" dirty="0">
+                  <a:latin typeface="Cambria Math" panose="02040503050406030204" pitchFamily="18" charset="0"/>
+                  <a:ea typeface="Cambria Math" panose="02040503050406030204" pitchFamily="18" charset="0"/>
+                </a:endParaRPr>
+              </a:p>
+              <a:p>
+                <a:endParaRPr lang="en-US" sz="2400" dirty="0">
+                  <a:latin typeface="Cambria Math" panose="02040503050406030204" pitchFamily="18" charset="0"/>
+                  <a:ea typeface="Cambria Math" panose="02040503050406030204" pitchFamily="18" charset="0"/>
+                </a:endParaRPr>
+              </a:p>
+              <a:p>
+                <a:endParaRPr lang="en-US" sz="2400" dirty="0">
+                  <a:latin typeface="Cambria Math" panose="02040503050406030204" pitchFamily="18" charset="0"/>
+                  <a:ea typeface="Cambria Math" panose="02040503050406030204" pitchFamily="18" charset="0"/>
+                </a:endParaRPr>
+              </a:p>
+              <a:p>
+                <a:endParaRPr lang="en-US" sz="2400" dirty="0">
+                  <a:latin typeface="Cambria Math" panose="02040503050406030204" pitchFamily="18" charset="0"/>
+                  <a:ea typeface="Cambria Math" panose="02040503050406030204" pitchFamily="18" charset="0"/>
+                </a:endParaRPr>
+              </a:p>
+            </p:txBody>
+          </p:sp>
+        </mc:Choice>
+        <mc:Fallback>
+          <p:sp>
+            <p:nvSpPr>
+              <p:cNvPr id="39" name="TextBox 38">
+                <a:extLst>
+                  <a:ext uri="{FF2B5EF4-FFF2-40B4-BE49-F238E27FC236}">
+                    <a16:creationId xmlns:a16="http://schemas.microsoft.com/office/drawing/2014/main" id="{6AC5ECAB-1D67-A3C8-2B09-37583778D8F8}"/>
+                  </a:ext>
+                </a:extLst>
+              </p:cNvPr>
+              <p:cNvSpPr txBox="1">
+                <a:spLocks noRot="1" noChangeAspect="1" noMove="1" noResize="1" noEditPoints="1" noAdjustHandles="1" noChangeArrowheads="1" noChangeShapeType="1" noTextEdit="1"/>
+              </p:cNvSpPr>
+              <p:nvPr/>
+            </p:nvSpPr>
+            <p:spPr>
+              <a:xfrm>
+                <a:off x="7845953" y="1937301"/>
+                <a:ext cx="3560911" cy="6001643"/>
+              </a:xfrm>
+              <a:prstGeom prst="rect">
+                <a:avLst/>
+              </a:prstGeom>
+              <a:blipFill>
+                <a:blip r:embed="rId15"/>
+                <a:stretch>
+                  <a:fillRect l="-355" t="-846" r="-1418"/>
+                </a:stretch>
+              </a:blipFill>
+            </p:spPr>
+            <p:txBody>
+              <a:bodyPr/>
+              <a:lstStyle/>
+              <a:p>
+                <a:r>
+                  <a:rPr lang="en-US">
+                    <a:noFill/>
+                  </a:rPr>
+                  <a:t> </a:t>
+                </a:r>
+              </a:p>
+            </p:txBody>
+          </p:sp>
+        </mc:Fallback>
+      </mc:AlternateContent>
+      <p:sp>
+        <p:nvSpPr>
+          <p:cNvPr id="55" name="Rectangle 54">
+            <a:extLst>
+              <a:ext uri="{FF2B5EF4-FFF2-40B4-BE49-F238E27FC236}">
+                <a16:creationId xmlns:a16="http://schemas.microsoft.com/office/drawing/2014/main" id="{67DD3F58-4A67-430E-19B8-DAA392FF1A1D}"/>
+              </a:ext>
+            </a:extLst>
+          </p:cNvPr>
+          <p:cNvSpPr/>
+          <p:nvPr/>
+        </p:nvSpPr>
+        <p:spPr>
+          <a:xfrm>
+            <a:off x="5923100" y="5010582"/>
+            <a:ext cx="812800" cy="731188"/>
+          </a:xfrm>
+          <a:prstGeom prst="rect">
+            <a:avLst/>
+          </a:prstGeom>
+          <a:noFill/>
+        </p:spPr>
+        <p:style>
+          <a:lnRef idx="2">
+            <a:schemeClr val="accent1">
+              <a:shade val="15000"/>
+            </a:schemeClr>
+          </a:lnRef>
+          <a:fillRef idx="1">
+            <a:schemeClr val="accent1"/>
+          </a:fillRef>
+          <a:effectRef idx="0">
+            <a:schemeClr val="accent1"/>
+          </a:effectRef>
+          <a:fontRef idx="minor">
+            <a:schemeClr val="lt1"/>
+          </a:fontRef>
+        </p:style>
+        <p:txBody>
+          <a:bodyPr rtlCol="0" anchor="ctr"/>
+          <a:lstStyle/>
+          <a:p>
+            <a:pPr algn="ctr"/>
+            <a:r>
+              <a:rPr lang="en-US" sz="2400" dirty="0">
+                <a:solidFill>
+                  <a:schemeClr val="bg1">
+                    <a:lumMod val="10000"/>
+                  </a:schemeClr>
+                </a:solidFill>
+                <a:latin typeface="Times New Roman" panose="02020603050405020304" pitchFamily="18" charset="0"/>
+                <a:cs typeface="Times New Roman" panose="02020603050405020304" pitchFamily="18" charset="0"/>
+              </a:rPr>
+              <a:t>R2</a:t>
+            </a:r>
+          </a:p>
+        </p:txBody>
+      </p:sp>
+      <p:sp>
+        <p:nvSpPr>
+          <p:cNvPr id="56" name="Rectangle 55">
+            <a:extLst>
+              <a:ext uri="{FF2B5EF4-FFF2-40B4-BE49-F238E27FC236}">
+                <a16:creationId xmlns:a16="http://schemas.microsoft.com/office/drawing/2014/main" id="{D33A5D67-55DD-96DE-D54C-8B576E6AD987}"/>
+              </a:ext>
+            </a:extLst>
+          </p:cNvPr>
+          <p:cNvSpPr/>
+          <p:nvPr/>
+        </p:nvSpPr>
+        <p:spPr>
+          <a:xfrm>
+            <a:off x="5917463" y="3863215"/>
+            <a:ext cx="812800" cy="731188"/>
+          </a:xfrm>
+          <a:prstGeom prst="rect">
+            <a:avLst/>
+          </a:prstGeom>
+          <a:noFill/>
+        </p:spPr>
+        <p:style>
+          <a:lnRef idx="2">
+            <a:schemeClr val="accent1">
+              <a:shade val="15000"/>
+            </a:schemeClr>
+          </a:lnRef>
+          <a:fillRef idx="1">
+            <a:schemeClr val="accent1"/>
+          </a:fillRef>
+          <a:effectRef idx="0">
+            <a:schemeClr val="accent1"/>
+          </a:effectRef>
+          <a:fontRef idx="minor">
+            <a:schemeClr val="lt1"/>
+          </a:fontRef>
+        </p:style>
+        <p:txBody>
+          <a:bodyPr rtlCol="0" anchor="ctr"/>
+          <a:lstStyle/>
+          <a:p>
+            <a:pPr algn="ctr"/>
+            <a:r>
+              <a:rPr lang="en-US" sz="2400" dirty="0">
+                <a:solidFill>
+                  <a:schemeClr val="bg1">
+                    <a:lumMod val="10000"/>
+                  </a:schemeClr>
+                </a:solidFill>
+                <a:latin typeface="Times New Roman" panose="02020603050405020304" pitchFamily="18" charset="0"/>
+                <a:cs typeface="Times New Roman" panose="02020603050405020304" pitchFamily="18" charset="0"/>
+              </a:rPr>
+              <a:t>D2</a:t>
+            </a:r>
+          </a:p>
+        </p:txBody>
+      </p:sp>
+      <p:cxnSp>
+        <p:nvCxnSpPr>
+          <p:cNvPr id="57" name="Straight Arrow Connector 56">
+            <a:extLst>
+              <a:ext uri="{FF2B5EF4-FFF2-40B4-BE49-F238E27FC236}">
+                <a16:creationId xmlns:a16="http://schemas.microsoft.com/office/drawing/2014/main" id="{4FEBB31D-B72C-3A11-9D6F-CCD10D1148B4}"/>
+              </a:ext>
+            </a:extLst>
+          </p:cNvPr>
+          <p:cNvCxnSpPr>
+            <a:cxnSpLocks/>
+            <a:endCxn id="55" idx="1"/>
+          </p:cNvCxnSpPr>
+          <p:nvPr/>
+        </p:nvCxnSpPr>
+        <p:spPr>
+          <a:xfrm>
+            <a:off x="5064977" y="4727850"/>
+            <a:ext cx="858123" cy="648327"/>
+          </a:xfrm>
+          <a:prstGeom prst="straightConnector1">
+            <a:avLst/>
+          </a:prstGeom>
+          <a:ln>
+            <a:solidFill>
+              <a:schemeClr val="tx1">
+                <a:lumMod val="50000"/>
+              </a:schemeClr>
+            </a:solidFill>
+            <a:tailEnd type="triangle"/>
+          </a:ln>
+        </p:spPr>
+        <p:style>
+          <a:lnRef idx="1">
+            <a:schemeClr val="accent1"/>
+          </a:lnRef>
+          <a:fillRef idx="0">
+            <a:schemeClr val="accent1"/>
+          </a:fillRef>
+          <a:effectRef idx="0">
+            <a:schemeClr val="accent1"/>
+          </a:effectRef>
+          <a:fontRef idx="minor">
+            <a:schemeClr val="tx1"/>
+          </a:fontRef>
+        </p:style>
+      </p:cxnSp>
+      <p:cxnSp>
+        <p:nvCxnSpPr>
+          <p:cNvPr id="58" name="Straight Arrow Connector 57">
+            <a:extLst>
+              <a:ext uri="{FF2B5EF4-FFF2-40B4-BE49-F238E27FC236}">
+                <a16:creationId xmlns:a16="http://schemas.microsoft.com/office/drawing/2014/main" id="{C07D3E03-AFE1-697E-C19E-0827E2712453}"/>
+              </a:ext>
+            </a:extLst>
+          </p:cNvPr>
+          <p:cNvCxnSpPr>
+            <a:cxnSpLocks/>
+            <a:endCxn id="56" idx="1"/>
+          </p:cNvCxnSpPr>
+          <p:nvPr/>
+        </p:nvCxnSpPr>
+        <p:spPr>
+          <a:xfrm flipV="1">
+            <a:off x="5064978" y="4228809"/>
+            <a:ext cx="852485" cy="499040"/>
+          </a:xfrm>
+          <a:prstGeom prst="straightConnector1">
+            <a:avLst/>
+          </a:prstGeom>
+          <a:ln>
+            <a:solidFill>
+              <a:schemeClr val="tx1">
+                <a:lumMod val="50000"/>
+              </a:schemeClr>
+            </a:solidFill>
+            <a:tailEnd type="triangle"/>
+          </a:ln>
+        </p:spPr>
+        <p:style>
+          <a:lnRef idx="1">
+            <a:schemeClr val="accent1"/>
+          </a:lnRef>
+          <a:fillRef idx="0">
+            <a:schemeClr val="accent1"/>
+          </a:fillRef>
+          <a:effectRef idx="0">
+            <a:schemeClr val="accent1"/>
+          </a:effectRef>
+          <a:fontRef idx="minor">
+            <a:schemeClr val="tx1"/>
+          </a:fontRef>
+        </p:style>
+      </p:cxnSp>
+      <mc:AlternateContent xmlns:mc="http://schemas.openxmlformats.org/markup-compatibility/2006">
+        <mc:Choice xmlns:a14="http://schemas.microsoft.com/office/drawing/2010/main" Requires="a14">
+          <p:sp>
+            <p:nvSpPr>
+              <p:cNvPr id="59" name="TextBox 58">
+                <a:extLst>
+                  <a:ext uri="{FF2B5EF4-FFF2-40B4-BE49-F238E27FC236}">
+                    <a16:creationId xmlns:a16="http://schemas.microsoft.com/office/drawing/2014/main" id="{D50D6FF5-FF6E-CC3C-162E-0884660E4A99}"/>
+                  </a:ext>
+                </a:extLst>
+              </p:cNvPr>
+              <p:cNvSpPr txBox="1"/>
+              <p:nvPr/>
+            </p:nvSpPr>
+            <p:spPr>
+              <a:xfrm>
+                <a:off x="5491221" y="4756528"/>
+                <a:ext cx="198772" cy="369332"/>
+              </a:xfrm>
+              <a:prstGeom prst="rect">
+                <a:avLst/>
+              </a:prstGeom>
+              <a:noFill/>
+            </p:spPr>
+            <p:txBody>
+              <a:bodyPr wrap="square" lIns="0" tIns="0" rIns="0" bIns="0" rtlCol="0">
+                <a:spAutoFit/>
+              </a:bodyPr>
+              <a:lstStyle/>
+              <a:p>
+                <a:pPr/>
+                <a14:m>
+                  <m:oMathPara xmlns:m="http://schemas.openxmlformats.org/officeDocument/2006/math">
+                    <m:oMathParaPr>
+                      <m:jc m:val="centerGroup"/>
+                    </m:oMathParaPr>
+                    <m:oMath xmlns:m="http://schemas.openxmlformats.org/officeDocument/2006/math">
+                      <m:r>
+                        <a:rPr lang="en-US" sz="2400" i="1">
+                          <a:latin typeface="Cambria Math" panose="02040503050406030204" pitchFamily="18" charset="0"/>
+                          <a:ea typeface="Cambria Math" panose="02040503050406030204" pitchFamily="18" charset="0"/>
+                        </a:rPr>
+                        <m:t>𝛾</m:t>
+                      </m:r>
+                    </m:oMath>
+                  </m:oMathPara>
+                </a14:m>
+                <a:endParaRPr lang="en-US" sz="2400" dirty="0"/>
+              </a:p>
+            </p:txBody>
+          </p:sp>
+        </mc:Choice>
+        <mc:Fallback>
+          <p:sp>
+            <p:nvSpPr>
+              <p:cNvPr id="59" name="TextBox 58">
+                <a:extLst>
+                  <a:ext uri="{FF2B5EF4-FFF2-40B4-BE49-F238E27FC236}">
+                    <a16:creationId xmlns:a16="http://schemas.microsoft.com/office/drawing/2014/main" id="{D50D6FF5-FF6E-CC3C-162E-0884660E4A99}"/>
+                  </a:ext>
+                </a:extLst>
+              </p:cNvPr>
+              <p:cNvSpPr txBox="1">
+                <a:spLocks noRot="1" noChangeAspect="1" noMove="1" noResize="1" noEditPoints="1" noAdjustHandles="1" noChangeArrowheads="1" noChangeShapeType="1" noTextEdit="1"/>
+              </p:cNvSpPr>
+              <p:nvPr/>
+            </p:nvSpPr>
+            <p:spPr>
+              <a:xfrm>
+                <a:off x="5491221" y="4756528"/>
+                <a:ext cx="198772" cy="369332"/>
+              </a:xfrm>
+              <a:prstGeom prst="rect">
+                <a:avLst/>
+              </a:prstGeom>
+              <a:blipFill>
+                <a:blip r:embed="rId16"/>
+                <a:stretch>
+                  <a:fillRect l="-43750" r="-43750" b="-20000"/>
+                </a:stretch>
+              </a:blipFill>
+            </p:spPr>
+            <p:txBody>
+              <a:bodyPr/>
+              <a:lstStyle/>
+              <a:p>
+                <a:r>
+                  <a:rPr lang="en-US">
+                    <a:noFill/>
+                  </a:rPr>
+                  <a:t> </a:t>
+                </a:r>
+              </a:p>
+            </p:txBody>
+          </p:sp>
+        </mc:Fallback>
+      </mc:AlternateContent>
+      <mc:AlternateContent xmlns:mc="http://schemas.openxmlformats.org/markup-compatibility/2006">
+        <mc:Choice xmlns:a14="http://schemas.microsoft.com/office/drawing/2010/main" Requires="a14">
+          <p:sp>
+            <p:nvSpPr>
+              <p:cNvPr id="60" name="TextBox 59">
+                <a:extLst>
+                  <a:ext uri="{FF2B5EF4-FFF2-40B4-BE49-F238E27FC236}">
+                    <a16:creationId xmlns:a16="http://schemas.microsoft.com/office/drawing/2014/main" id="{8541F6B9-71A4-2B98-5EBB-D4191C771823}"/>
+                  </a:ext>
+                </a:extLst>
+              </p:cNvPr>
+              <p:cNvSpPr txBox="1"/>
+              <p:nvPr/>
+            </p:nvSpPr>
+            <p:spPr>
+              <a:xfrm>
+                <a:off x="5452625" y="4019887"/>
+                <a:ext cx="216727" cy="738664"/>
+              </a:xfrm>
+              <a:prstGeom prst="rect">
+                <a:avLst/>
+              </a:prstGeom>
+              <a:noFill/>
+            </p:spPr>
+            <p:txBody>
+              <a:bodyPr wrap="square" lIns="0" tIns="0" rIns="0" bIns="0" rtlCol="0">
+                <a:spAutoFit/>
+              </a:bodyPr>
+              <a:lstStyle/>
+              <a:p>
+                <a:pPr/>
+                <a14:m>
+                  <m:oMathPara xmlns:m="http://schemas.openxmlformats.org/officeDocument/2006/math">
+                    <m:oMathParaPr>
+                      <m:jc m:val="centerGroup"/>
+                    </m:oMathParaPr>
+                    <m:oMath xmlns:m="http://schemas.openxmlformats.org/officeDocument/2006/math">
+                      <m:sSub>
+                        <m:sSubPr>
+                          <m:ctrlPr>
+                            <a:rPr lang="en-US" sz="2400" i="1">
+                              <a:latin typeface="Cambria Math" panose="02040503050406030204" pitchFamily="18" charset="0"/>
+                              <a:ea typeface="Cambria Math" panose="02040503050406030204" pitchFamily="18" charset="0"/>
+                            </a:rPr>
+                          </m:ctrlPr>
+                        </m:sSubPr>
+                        <m:e>
+                          <m:r>
+                            <a:rPr lang="en-US" sz="2400" i="1">
+                              <a:latin typeface="Cambria Math" panose="02040503050406030204" pitchFamily="18" charset="0"/>
+                              <a:ea typeface="Cambria Math" panose="02040503050406030204" pitchFamily="18" charset="0"/>
+                            </a:rPr>
+                            <m:t>𝛼</m:t>
+                          </m:r>
+                        </m:e>
+                        <m:sub>
+                          <m:r>
+                            <a:rPr lang="en-US" sz="2400" i="1">
+                              <a:latin typeface="Cambria Math" panose="02040503050406030204" pitchFamily="18" charset="0"/>
+                              <a:ea typeface="Cambria Math" panose="02040503050406030204" pitchFamily="18" charset="0"/>
+                            </a:rPr>
+                            <m:t>2</m:t>
+                          </m:r>
+                        </m:sub>
+                      </m:sSub>
+                    </m:oMath>
+                  </m:oMathPara>
+                </a14:m>
+                <a:endParaRPr lang="en-US" sz="2400" dirty="0">
+                  <a:ea typeface="Cambria Math" panose="02040503050406030204" pitchFamily="18" charset="0"/>
+                </a:endParaRPr>
+              </a:p>
+              <a:p>
+                <a:endParaRPr lang="en-US" sz="2400" dirty="0"/>
+              </a:p>
+            </p:txBody>
+          </p:sp>
+        </mc:Choice>
+        <mc:Fallback>
+          <p:sp>
+            <p:nvSpPr>
+              <p:cNvPr id="60" name="TextBox 59">
+                <a:extLst>
+                  <a:ext uri="{FF2B5EF4-FFF2-40B4-BE49-F238E27FC236}">
+                    <a16:creationId xmlns:a16="http://schemas.microsoft.com/office/drawing/2014/main" id="{8541F6B9-71A4-2B98-5EBB-D4191C771823}"/>
+                  </a:ext>
+                </a:extLst>
+              </p:cNvPr>
+              <p:cNvSpPr txBox="1">
+                <a:spLocks noRot="1" noChangeAspect="1" noMove="1" noResize="1" noEditPoints="1" noAdjustHandles="1" noChangeArrowheads="1" noChangeShapeType="1" noTextEdit="1"/>
+              </p:cNvSpPr>
+              <p:nvPr/>
+            </p:nvSpPr>
+            <p:spPr>
+              <a:xfrm>
+                <a:off x="5452625" y="4019887"/>
+                <a:ext cx="216727" cy="738664"/>
+              </a:xfrm>
+              <a:prstGeom prst="rect">
+                <a:avLst/>
+              </a:prstGeom>
+              <a:blipFill>
+                <a:blip r:embed="rId17"/>
+                <a:stretch>
+                  <a:fillRect l="-33333" r="-72222"/>
+                </a:stretch>
+              </a:blipFill>
+            </p:spPr>
+            <p:txBody>
+              <a:bodyPr/>
+              <a:lstStyle/>
+              <a:p>
+                <a:r>
+                  <a:rPr lang="en-US">
+                    <a:noFill/>
+                  </a:rPr>
+                  <a:t> </a:t>
+                </a:r>
+              </a:p>
+            </p:txBody>
+          </p:sp>
+        </mc:Fallback>
+      </mc:AlternateContent>
+      <p:cxnSp>
+        <p:nvCxnSpPr>
+          <p:cNvPr id="63" name="Straight Arrow Connector 62">
+            <a:extLst>
+              <a:ext uri="{FF2B5EF4-FFF2-40B4-BE49-F238E27FC236}">
+                <a16:creationId xmlns:a16="http://schemas.microsoft.com/office/drawing/2014/main" id="{0FD72DED-1BCB-3CE5-071B-34786BBF717A}"/>
+              </a:ext>
+            </a:extLst>
+          </p:cNvPr>
+          <p:cNvCxnSpPr>
+            <a:cxnSpLocks/>
+          </p:cNvCxnSpPr>
+          <p:nvPr/>
+        </p:nvCxnSpPr>
+        <p:spPr>
+          <a:xfrm flipH="1">
+            <a:off x="5914637" y="3388128"/>
+            <a:ext cx="385049" cy="340571"/>
+          </a:xfrm>
+          <a:prstGeom prst="straightConnector1">
+            <a:avLst/>
+          </a:prstGeom>
+          <a:ln>
+            <a:solidFill>
+              <a:schemeClr val="accent2">
+                <a:lumMod val="75000"/>
+              </a:schemeClr>
+            </a:solidFill>
+            <a:tailEnd type="triangle"/>
+          </a:ln>
+        </p:spPr>
+        <p:style>
+          <a:lnRef idx="1">
+            <a:schemeClr val="accent1"/>
+          </a:lnRef>
+          <a:fillRef idx="0">
+            <a:schemeClr val="accent1"/>
+          </a:fillRef>
+          <a:effectRef idx="0">
+            <a:schemeClr val="accent1"/>
+          </a:effectRef>
+          <a:fontRef idx="minor">
+            <a:schemeClr val="tx1"/>
+          </a:fontRef>
+        </p:style>
+      </p:cxnSp>
+      <mc:AlternateContent xmlns:mc="http://schemas.openxmlformats.org/markup-compatibility/2006">
+        <mc:Choice xmlns:a14="http://schemas.microsoft.com/office/drawing/2010/main" Requires="a14">
+          <p:sp>
+            <p:nvSpPr>
+              <p:cNvPr id="192" name="TextBox 191">
+                <a:extLst>
+                  <a:ext uri="{FF2B5EF4-FFF2-40B4-BE49-F238E27FC236}">
+                    <a16:creationId xmlns:a16="http://schemas.microsoft.com/office/drawing/2014/main" id="{AD32AD20-B02E-8C94-6892-29A4A21A9EFF}"/>
+                  </a:ext>
+                </a:extLst>
+              </p:cNvPr>
+              <p:cNvSpPr txBox="1"/>
+              <p:nvPr/>
+            </p:nvSpPr>
+            <p:spPr>
+              <a:xfrm>
+                <a:off x="5992633" y="3452744"/>
+                <a:ext cx="440548" cy="297454"/>
+              </a:xfrm>
+              <a:prstGeom prst="rect">
+                <a:avLst/>
+              </a:prstGeom>
+              <a:noFill/>
+            </p:spPr>
+            <p:txBody>
+              <a:bodyPr wrap="square" rtlCol="0">
+                <a:spAutoFit/>
+              </a:bodyPr>
+              <a:lstStyle/>
+              <a:p>
+                <a:pPr/>
+                <a14:m>
+                  <m:oMathPara xmlns:m="http://schemas.openxmlformats.org/officeDocument/2006/math">
+                    <m:oMathParaPr>
+                      <m:jc m:val="centerGroup"/>
+                    </m:oMathParaPr>
+                    <m:oMath xmlns:m="http://schemas.openxmlformats.org/officeDocument/2006/math">
+                      <m:r>
+                        <a:rPr lang="en-US" sz="1333" i="1" dirty="0">
+                          <a:solidFill>
+                            <a:schemeClr val="accent1">
+                              <a:lumMod val="60000"/>
+                              <a:lumOff val="40000"/>
+                            </a:schemeClr>
+                          </a:solidFill>
+                          <a:latin typeface="Cambria Math" panose="02040503050406030204" pitchFamily="18" charset="0"/>
+                          <a:ea typeface="Cambria Math" panose="02040503050406030204" pitchFamily="18" charset="0"/>
+                        </a:rPr>
+                        <m:t>𝛿</m:t>
+                      </m:r>
+                    </m:oMath>
+                  </m:oMathPara>
+                </a14:m>
+                <a:endParaRPr lang="en-US" sz="1333" dirty="0">
+                  <a:solidFill>
+                    <a:schemeClr val="accent1">
+                      <a:lumMod val="60000"/>
+                      <a:lumOff val="40000"/>
+                    </a:schemeClr>
+                  </a:solidFill>
+                </a:endParaRPr>
+              </a:p>
+            </p:txBody>
+          </p:sp>
+        </mc:Choice>
+        <mc:Fallback>
+          <p:sp>
+            <p:nvSpPr>
+              <p:cNvPr id="192" name="TextBox 191">
+                <a:extLst>
+                  <a:ext uri="{FF2B5EF4-FFF2-40B4-BE49-F238E27FC236}">
+                    <a16:creationId xmlns:a16="http://schemas.microsoft.com/office/drawing/2014/main" id="{AD32AD20-B02E-8C94-6892-29A4A21A9EFF}"/>
+                  </a:ext>
+                </a:extLst>
+              </p:cNvPr>
+              <p:cNvSpPr txBox="1">
+                <a:spLocks noRot="1" noChangeAspect="1" noMove="1" noResize="1" noEditPoints="1" noAdjustHandles="1" noChangeArrowheads="1" noChangeShapeType="1" noTextEdit="1"/>
+              </p:cNvSpPr>
+              <p:nvPr/>
+            </p:nvSpPr>
+            <p:spPr>
+              <a:xfrm>
+                <a:off x="5992633" y="3452744"/>
+                <a:ext cx="440548" cy="297454"/>
+              </a:xfrm>
+              <a:prstGeom prst="rect">
+                <a:avLst/>
+              </a:prstGeom>
+              <a:blipFill>
+                <a:blip r:embed="rId14"/>
+                <a:stretch>
+                  <a:fillRect/>
+                </a:stretch>
+              </a:blipFill>
+            </p:spPr>
+            <p:txBody>
+              <a:bodyPr/>
+              <a:lstStyle/>
+              <a:p>
+                <a:r>
+                  <a:rPr lang="en-US">
+                    <a:noFill/>
+                  </a:rPr>
+                  <a:t> </a:t>
+                </a:r>
+              </a:p>
+            </p:txBody>
+          </p:sp>
+        </mc:Fallback>
+      </mc:AlternateContent>
+      <p:cxnSp>
+        <p:nvCxnSpPr>
+          <p:cNvPr id="194" name="Straight Arrow Connector 193">
+            <a:extLst>
+              <a:ext uri="{FF2B5EF4-FFF2-40B4-BE49-F238E27FC236}">
+                <a16:creationId xmlns:a16="http://schemas.microsoft.com/office/drawing/2014/main" id="{F4425441-8E09-73C2-F340-79AF8B2DA140}"/>
+              </a:ext>
+            </a:extLst>
+          </p:cNvPr>
+          <p:cNvCxnSpPr>
+            <a:cxnSpLocks/>
+          </p:cNvCxnSpPr>
+          <p:nvPr/>
+        </p:nvCxnSpPr>
+        <p:spPr>
+          <a:xfrm flipH="1">
+            <a:off x="5939098" y="5742759"/>
+            <a:ext cx="385049" cy="340571"/>
+          </a:xfrm>
+          <a:prstGeom prst="straightConnector1">
+            <a:avLst/>
+          </a:prstGeom>
+          <a:ln>
+            <a:solidFill>
+              <a:schemeClr val="accent2">
+                <a:lumMod val="75000"/>
+              </a:schemeClr>
+            </a:solidFill>
+            <a:tailEnd type="triangle"/>
+          </a:ln>
+        </p:spPr>
+        <p:style>
+          <a:lnRef idx="1">
+            <a:schemeClr val="accent1"/>
+          </a:lnRef>
+          <a:fillRef idx="0">
+            <a:schemeClr val="accent1"/>
+          </a:fillRef>
+          <a:effectRef idx="0">
+            <a:schemeClr val="accent1"/>
+          </a:effectRef>
+          <a:fontRef idx="minor">
+            <a:schemeClr val="tx1"/>
+          </a:fontRef>
+        </p:style>
+      </p:cxnSp>
+      <mc:AlternateContent xmlns:mc="http://schemas.openxmlformats.org/markup-compatibility/2006">
+        <mc:Choice xmlns:a14="http://schemas.microsoft.com/office/drawing/2010/main" Requires="a14">
+          <p:sp>
+            <p:nvSpPr>
+              <p:cNvPr id="195" name="TextBox 194">
+                <a:extLst>
+                  <a:ext uri="{FF2B5EF4-FFF2-40B4-BE49-F238E27FC236}">
+                    <a16:creationId xmlns:a16="http://schemas.microsoft.com/office/drawing/2014/main" id="{BD22BD41-8BE0-38B3-C426-9A2667FEDE6D}"/>
+                  </a:ext>
+                </a:extLst>
+              </p:cNvPr>
+              <p:cNvSpPr txBox="1"/>
+              <p:nvPr/>
+            </p:nvSpPr>
+            <p:spPr>
+              <a:xfrm>
+                <a:off x="6003547" y="5820922"/>
+                <a:ext cx="440548" cy="297454"/>
+              </a:xfrm>
+              <a:prstGeom prst="rect">
+                <a:avLst/>
+              </a:prstGeom>
+              <a:noFill/>
+            </p:spPr>
+            <p:txBody>
+              <a:bodyPr wrap="square" rtlCol="0">
+                <a:spAutoFit/>
+              </a:bodyPr>
+              <a:lstStyle/>
+              <a:p>
+                <a:pPr/>
+                <a14:m>
+                  <m:oMathPara xmlns:m="http://schemas.openxmlformats.org/officeDocument/2006/math">
+                    <m:oMathParaPr>
+                      <m:jc m:val="centerGroup"/>
+                    </m:oMathParaPr>
+                    <m:oMath xmlns:m="http://schemas.openxmlformats.org/officeDocument/2006/math">
+                      <m:r>
+                        <a:rPr lang="en-US" sz="1333" i="1" dirty="0">
+                          <a:solidFill>
+                            <a:schemeClr val="accent1">
+                              <a:lumMod val="60000"/>
+                              <a:lumOff val="40000"/>
+                            </a:schemeClr>
+                          </a:solidFill>
+                          <a:latin typeface="Cambria Math" panose="02040503050406030204" pitchFamily="18" charset="0"/>
+                          <a:ea typeface="Cambria Math" panose="02040503050406030204" pitchFamily="18" charset="0"/>
+                        </a:rPr>
+                        <m:t>𝛿</m:t>
+                      </m:r>
+                    </m:oMath>
+                  </m:oMathPara>
+                </a14:m>
+                <a:endParaRPr lang="en-US" sz="1333" dirty="0">
+                  <a:solidFill>
+                    <a:schemeClr val="accent1">
+                      <a:lumMod val="60000"/>
+                      <a:lumOff val="40000"/>
+                    </a:schemeClr>
+                  </a:solidFill>
+                </a:endParaRPr>
+              </a:p>
+            </p:txBody>
+          </p:sp>
+        </mc:Choice>
+        <mc:Fallback>
+          <p:sp>
+            <p:nvSpPr>
+              <p:cNvPr id="195" name="TextBox 194">
+                <a:extLst>
+                  <a:ext uri="{FF2B5EF4-FFF2-40B4-BE49-F238E27FC236}">
+                    <a16:creationId xmlns:a16="http://schemas.microsoft.com/office/drawing/2014/main" id="{BD22BD41-8BE0-38B3-C426-9A2667FEDE6D}"/>
+                  </a:ext>
+                </a:extLst>
+              </p:cNvPr>
+              <p:cNvSpPr txBox="1">
+                <a:spLocks noRot="1" noChangeAspect="1" noMove="1" noResize="1" noEditPoints="1" noAdjustHandles="1" noChangeArrowheads="1" noChangeShapeType="1" noTextEdit="1"/>
+              </p:cNvSpPr>
+              <p:nvPr/>
+            </p:nvSpPr>
+            <p:spPr>
+              <a:xfrm>
+                <a:off x="6003547" y="5820922"/>
+                <a:ext cx="440548" cy="297454"/>
+              </a:xfrm>
+              <a:prstGeom prst="rect">
+                <a:avLst/>
+              </a:prstGeom>
+              <a:blipFill>
+                <a:blip r:embed="rId18"/>
+                <a:stretch>
+                  <a:fillRect/>
+                </a:stretch>
+              </a:blipFill>
+            </p:spPr>
+            <p:txBody>
+              <a:bodyPr/>
+              <a:lstStyle/>
+              <a:p>
+                <a:r>
+                  <a:rPr lang="en-US">
+                    <a:noFill/>
+                  </a:rPr>
+                  <a:t> </a:t>
+                </a:r>
+              </a:p>
+            </p:txBody>
+          </p:sp>
+        </mc:Fallback>
+      </mc:AlternateContent>
+    </p:spTree>
+    <p:extLst>
+      <p:ext uri="{BB962C8B-B14F-4D97-AF65-F5344CB8AC3E}">
+        <p14:creationId xmlns:p14="http://schemas.microsoft.com/office/powerpoint/2010/main" val="2277112315"/>
+      </p:ext>
+    </p:extLst>
+  </p:cSld>
+  <p:clrMapOvr>
+    <a:masterClrMapping/>
+  </p:clrMapOvr>
+</p:sld>
+</file>
+
 <file path=ppt/slides/slide4.xml><?xml version="1.0" encoding="utf-8"?>
 <p:sld xmlns:a="http://schemas.openxmlformats.org/drawingml/2006/main" xmlns:r="http://schemas.openxmlformats.org/officeDocument/2006/relationships" xmlns:p="http://schemas.openxmlformats.org/presentationml/2006/main">
   <p:cSld>

</xml_diff>